<commit_message>
update ch01 and ch04
</commit_message>
<xml_diff>
--- a/materials/slides/ch04.pptx
+++ b/materials/slides/ch04.pptx
@@ -260,13 +260,7 @@
       </p:grpSpPr>
       <p:sp>
         <p:nvSpPr>
-          <p:cNvPr id="87042" name="Rectangle 2">
-            <a:extLst>
-              <a:ext uri="{FF2B5EF4-FFF2-40B4-BE49-F238E27FC236}">
-                <a16:creationId xmlns:a16="http://schemas.microsoft.com/office/drawing/2014/main" id="{76C2E555-9602-4FCF-9DDE-DC45B89FAE1C}"/>
-              </a:ext>
-            </a:extLst>
-          </p:cNvPr>
+          <p:cNvPr id="87042" name="Rectangle 2"/>
           <p:cNvSpPr>
             <a:spLocks noGrp="1" noChangeArrowheads="1"/>
           </p:cNvSpPr>
@@ -314,13 +308,7 @@
       </p:sp>
       <p:sp>
         <p:nvSpPr>
-          <p:cNvPr id="87043" name="Rectangle 3">
-            <a:extLst>
-              <a:ext uri="{FF2B5EF4-FFF2-40B4-BE49-F238E27FC236}">
-                <a16:creationId xmlns:a16="http://schemas.microsoft.com/office/drawing/2014/main" id="{1FD51799-046B-4C45-A0F8-2D36DA4FD506}"/>
-              </a:ext>
-            </a:extLst>
-          </p:cNvPr>
+          <p:cNvPr id="87043" name="Rectangle 3"/>
           <p:cNvSpPr>
             <a:spLocks noGrp="1" noChangeArrowheads="1"/>
           </p:cNvSpPr>
@@ -368,13 +356,7 @@
       </p:sp>
       <p:sp>
         <p:nvSpPr>
-          <p:cNvPr id="87044" name="Rectangle 4">
-            <a:extLst>
-              <a:ext uri="{FF2B5EF4-FFF2-40B4-BE49-F238E27FC236}">
-                <a16:creationId xmlns:a16="http://schemas.microsoft.com/office/drawing/2014/main" id="{8B06EA84-1096-40F5-B68F-9A6416FE06EB}"/>
-              </a:ext>
-            </a:extLst>
-          </p:cNvPr>
+          <p:cNvPr id="87044" name="Rectangle 4"/>
           <p:cNvSpPr>
             <a:spLocks noGrp="1" noChangeArrowheads="1"/>
           </p:cNvSpPr>
@@ -422,13 +404,7 @@
       </p:sp>
       <p:sp>
         <p:nvSpPr>
-          <p:cNvPr id="87045" name="Rectangle 5">
-            <a:extLst>
-              <a:ext uri="{FF2B5EF4-FFF2-40B4-BE49-F238E27FC236}">
-                <a16:creationId xmlns:a16="http://schemas.microsoft.com/office/drawing/2014/main" id="{48C6CA66-4EE2-4072-9E7D-2DE84A81D909}"/>
-              </a:ext>
-            </a:extLst>
-          </p:cNvPr>
+          <p:cNvPr id="87045" name="Rectangle 5"/>
           <p:cNvSpPr>
             <a:spLocks noGrp="1" noChangeArrowheads="1"/>
           </p:cNvSpPr>
@@ -465,14 +441,9 @@
             </a:lvl1pPr>
           </a:lstStyle>
           <a:p>
-            <a:pPr>
-              <a:defRPr/>
-            </a:pPr>
-            <a:fld id="{DB639B76-AEA2-4634-B310-6BD4BCA82784}" type="slidenum">
+            <a:fld id="{DCB45A91-2560-4621-9EEC-736C7A330F22}" type="slidenum">
               <a:rPr lang="en-US" altLang="zh-CN"/>
-              <a:pPr>
-                <a:defRPr/>
-              </a:pPr>
+              <a:pPr/>
               <a:t>‹#›</a:t>
             </a:fld>
             <a:endParaRPr lang="en-US" altLang="zh-CN"/>
@@ -512,13 +483,7 @@
       </p:grpSpPr>
       <p:sp>
         <p:nvSpPr>
-          <p:cNvPr id="112642" name="Rectangle 2">
-            <a:extLst>
-              <a:ext uri="{FF2B5EF4-FFF2-40B4-BE49-F238E27FC236}">
-                <a16:creationId xmlns:a16="http://schemas.microsoft.com/office/drawing/2014/main" id="{198C8E01-6435-44FB-BECA-B870E0F6AB93}"/>
-              </a:ext>
-            </a:extLst>
-          </p:cNvPr>
+          <p:cNvPr id="112642" name="Rectangle 2"/>
           <p:cNvSpPr>
             <a:spLocks noGrp="1" noChangeArrowheads="1"/>
           </p:cNvSpPr>
@@ -539,34 +504,6 @@
             <a:noFill/>
           </a:ln>
           <a:effectLst/>
-          <a:extLst>
-            <a:ext uri="{909E8E84-426E-40DD-AFC4-6F175D3DCCD1}">
-              <a14:hiddenFill xmlns:a14="http://schemas.microsoft.com/office/drawing/2010/main">
-                <a:solidFill>
-                  <a:schemeClr val="accent1"/>
-                </a:solidFill>
-              </a14:hiddenFill>
-            </a:ext>
-            <a:ext uri="{91240B29-F687-4F45-9708-019B960494DF}">
-              <a14:hiddenLine xmlns:a14="http://schemas.microsoft.com/office/drawing/2010/main" w="9525">
-                <a:solidFill>
-                  <a:schemeClr val="tx1"/>
-                </a:solidFill>
-                <a:miter lim="800000"/>
-                <a:headEnd/>
-                <a:tailEnd/>
-              </a14:hiddenLine>
-            </a:ext>
-            <a:ext uri="{AF507438-7753-43E0-B8FC-AC1667EBCBE1}">
-              <a14:hiddenEffects xmlns:a14="http://schemas.microsoft.com/office/drawing/2010/main">
-                <a:effectLst>
-                  <a:outerShdw dist="35921" dir="2700000" algn="ctr" rotWithShape="0">
-                    <a:schemeClr val="bg2"/>
-                  </a:outerShdw>
-                </a:effectLst>
-              </a14:hiddenEffects>
-            </a:ext>
-          </a:extLst>
         </p:spPr>
         <p:txBody>
           <a:bodyPr vert="horz" wrap="square" lIns="91440" tIns="45720" rIns="91440" bIns="45720" numCol="1" anchor="t" anchorCtr="0" compatLnSpc="1">
@@ -591,13 +528,7 @@
       </p:sp>
       <p:sp>
         <p:nvSpPr>
-          <p:cNvPr id="112643" name="Rectangle 3">
-            <a:extLst>
-              <a:ext uri="{FF2B5EF4-FFF2-40B4-BE49-F238E27FC236}">
-                <a16:creationId xmlns:a16="http://schemas.microsoft.com/office/drawing/2014/main" id="{7159F7CA-9EDD-43DD-9F96-A04A7B9100AB}"/>
-              </a:ext>
-            </a:extLst>
-          </p:cNvPr>
+          <p:cNvPr id="112643" name="Rectangle 3"/>
           <p:cNvSpPr>
             <a:spLocks noGrp="1" noChangeArrowheads="1"/>
           </p:cNvSpPr>
@@ -618,34 +549,6 @@
             <a:noFill/>
           </a:ln>
           <a:effectLst/>
-          <a:extLst>
-            <a:ext uri="{909E8E84-426E-40DD-AFC4-6F175D3DCCD1}">
-              <a14:hiddenFill xmlns:a14="http://schemas.microsoft.com/office/drawing/2010/main">
-                <a:solidFill>
-                  <a:schemeClr val="accent1"/>
-                </a:solidFill>
-              </a14:hiddenFill>
-            </a:ext>
-            <a:ext uri="{91240B29-F687-4F45-9708-019B960494DF}">
-              <a14:hiddenLine xmlns:a14="http://schemas.microsoft.com/office/drawing/2010/main" w="9525">
-                <a:solidFill>
-                  <a:schemeClr val="tx1"/>
-                </a:solidFill>
-                <a:miter lim="800000"/>
-                <a:headEnd/>
-                <a:tailEnd/>
-              </a14:hiddenLine>
-            </a:ext>
-            <a:ext uri="{AF507438-7753-43E0-B8FC-AC1667EBCBE1}">
-              <a14:hiddenEffects xmlns:a14="http://schemas.microsoft.com/office/drawing/2010/main">
-                <a:effectLst>
-                  <a:outerShdw dist="35921" dir="2700000" algn="ctr" rotWithShape="0">
-                    <a:schemeClr val="bg2"/>
-                  </a:outerShdw>
-                </a:effectLst>
-              </a14:hiddenEffects>
-            </a:ext>
-          </a:extLst>
         </p:spPr>
         <p:txBody>
           <a:bodyPr vert="horz" wrap="square" lIns="91440" tIns="45720" rIns="91440" bIns="45720" numCol="1" anchor="t" anchorCtr="0" compatLnSpc="1">
@@ -664,12 +567,12 @@
             <a:pPr>
               <a:defRPr/>
             </a:pPr>
-            <a:fld id="{F7EA28BF-303D-4BD8-A2C9-B477379A05C5}" type="datetimeFigureOut">
+            <a:fld id="{F0EBF006-0E41-4FD4-A70D-DA4F996E7CB1}" type="datetimeFigureOut">
               <a:rPr lang="zh-CN" altLang="en-US"/>
               <a:pPr>
                 <a:defRPr/>
               </a:pPr>
-              <a:t>2018/11/29</a:t>
+              <a:t>2020/9/29</a:t>
             </a:fld>
             <a:endParaRPr lang="en-US" altLang="zh-CN"/>
           </a:p>
@@ -728,13 +631,7 @@
       </p:sp>
       <p:sp>
         <p:nvSpPr>
-          <p:cNvPr id="112645" name="Rectangle 5">
-            <a:extLst>
-              <a:ext uri="{FF2B5EF4-FFF2-40B4-BE49-F238E27FC236}">
-                <a16:creationId xmlns:a16="http://schemas.microsoft.com/office/drawing/2014/main" id="{43644D14-101B-4EEC-BCA0-E45D19799591}"/>
-              </a:ext>
-            </a:extLst>
-          </p:cNvPr>
+          <p:cNvPr id="112645" name="Rectangle 5"/>
           <p:cNvSpPr>
             <a:spLocks noGrp="1" noChangeArrowheads="1"/>
           </p:cNvSpPr>
@@ -755,34 +652,6 @@
             <a:noFill/>
           </a:ln>
           <a:effectLst/>
-          <a:extLst>
-            <a:ext uri="{909E8E84-426E-40DD-AFC4-6F175D3DCCD1}">
-              <a14:hiddenFill xmlns:a14="http://schemas.microsoft.com/office/drawing/2010/main">
-                <a:solidFill>
-                  <a:schemeClr val="accent1"/>
-                </a:solidFill>
-              </a14:hiddenFill>
-            </a:ext>
-            <a:ext uri="{91240B29-F687-4F45-9708-019B960494DF}">
-              <a14:hiddenLine xmlns:a14="http://schemas.microsoft.com/office/drawing/2010/main" w="9525">
-                <a:solidFill>
-                  <a:schemeClr val="tx1"/>
-                </a:solidFill>
-                <a:miter lim="800000"/>
-                <a:headEnd/>
-                <a:tailEnd/>
-              </a14:hiddenLine>
-            </a:ext>
-            <a:ext uri="{AF507438-7753-43E0-B8FC-AC1667EBCBE1}">
-              <a14:hiddenEffects xmlns:a14="http://schemas.microsoft.com/office/drawing/2010/main">
-                <a:effectLst>
-                  <a:outerShdw dist="35921" dir="2700000" algn="ctr" rotWithShape="0">
-                    <a:schemeClr val="bg2"/>
-                  </a:outerShdw>
-                </a:effectLst>
-              </a14:hiddenEffects>
-            </a:ext>
-          </a:extLst>
         </p:spPr>
         <p:txBody>
           <a:bodyPr vert="horz" wrap="square" lIns="91440" tIns="45720" rIns="91440" bIns="45720" numCol="1" anchor="t" anchorCtr="0" compatLnSpc="1">
@@ -830,13 +699,7 @@
       </p:sp>
       <p:sp>
         <p:nvSpPr>
-          <p:cNvPr id="112646" name="Rectangle 6">
-            <a:extLst>
-              <a:ext uri="{FF2B5EF4-FFF2-40B4-BE49-F238E27FC236}">
-                <a16:creationId xmlns:a16="http://schemas.microsoft.com/office/drawing/2014/main" id="{CD98F970-92A3-4D55-889B-7A58139BE1BA}"/>
-              </a:ext>
-            </a:extLst>
-          </p:cNvPr>
+          <p:cNvPr id="112646" name="Rectangle 6"/>
           <p:cNvSpPr>
             <a:spLocks noGrp="1" noChangeArrowheads="1"/>
           </p:cNvSpPr>
@@ -857,34 +720,6 @@
             <a:noFill/>
           </a:ln>
           <a:effectLst/>
-          <a:extLst>
-            <a:ext uri="{909E8E84-426E-40DD-AFC4-6F175D3DCCD1}">
-              <a14:hiddenFill xmlns:a14="http://schemas.microsoft.com/office/drawing/2010/main">
-                <a:solidFill>
-                  <a:schemeClr val="accent1"/>
-                </a:solidFill>
-              </a14:hiddenFill>
-            </a:ext>
-            <a:ext uri="{91240B29-F687-4F45-9708-019B960494DF}">
-              <a14:hiddenLine xmlns:a14="http://schemas.microsoft.com/office/drawing/2010/main" w="9525">
-                <a:solidFill>
-                  <a:schemeClr val="tx1"/>
-                </a:solidFill>
-                <a:miter lim="800000"/>
-                <a:headEnd/>
-                <a:tailEnd/>
-              </a14:hiddenLine>
-            </a:ext>
-            <a:ext uri="{AF507438-7753-43E0-B8FC-AC1667EBCBE1}">
-              <a14:hiddenEffects xmlns:a14="http://schemas.microsoft.com/office/drawing/2010/main">
-                <a:effectLst>
-                  <a:outerShdw dist="35921" dir="2700000" algn="ctr" rotWithShape="0">
-                    <a:schemeClr val="bg2"/>
-                  </a:outerShdw>
-                </a:effectLst>
-              </a14:hiddenEffects>
-            </a:ext>
-          </a:extLst>
         </p:spPr>
         <p:txBody>
           <a:bodyPr vert="horz" wrap="square" lIns="91440" tIns="45720" rIns="91440" bIns="45720" numCol="1" anchor="b" anchorCtr="0" compatLnSpc="1">
@@ -909,13 +744,7 @@
       </p:sp>
       <p:sp>
         <p:nvSpPr>
-          <p:cNvPr id="112647" name="Rectangle 7">
-            <a:extLst>
-              <a:ext uri="{FF2B5EF4-FFF2-40B4-BE49-F238E27FC236}">
-                <a16:creationId xmlns:a16="http://schemas.microsoft.com/office/drawing/2014/main" id="{01AB14ED-995D-4849-9B7E-F09EEA277A26}"/>
-              </a:ext>
-            </a:extLst>
-          </p:cNvPr>
+          <p:cNvPr id="112647" name="Rectangle 7"/>
           <p:cNvSpPr>
             <a:spLocks noGrp="1" noChangeArrowheads="1"/>
           </p:cNvSpPr>
@@ -936,34 +765,6 @@
             <a:noFill/>
           </a:ln>
           <a:effectLst/>
-          <a:extLst>
-            <a:ext uri="{909E8E84-426E-40DD-AFC4-6F175D3DCCD1}">
-              <a14:hiddenFill xmlns:a14="http://schemas.microsoft.com/office/drawing/2010/main">
-                <a:solidFill>
-                  <a:schemeClr val="accent1"/>
-                </a:solidFill>
-              </a14:hiddenFill>
-            </a:ext>
-            <a:ext uri="{91240B29-F687-4F45-9708-019B960494DF}">
-              <a14:hiddenLine xmlns:a14="http://schemas.microsoft.com/office/drawing/2010/main" w="9525">
-                <a:solidFill>
-                  <a:schemeClr val="tx1"/>
-                </a:solidFill>
-                <a:miter lim="800000"/>
-                <a:headEnd/>
-                <a:tailEnd/>
-              </a14:hiddenLine>
-            </a:ext>
-            <a:ext uri="{AF507438-7753-43E0-B8FC-AC1667EBCBE1}">
-              <a14:hiddenEffects xmlns:a14="http://schemas.microsoft.com/office/drawing/2010/main">
-                <a:effectLst>
-                  <a:outerShdw dist="35921" dir="2700000" algn="ctr" rotWithShape="0">
-                    <a:schemeClr val="bg2"/>
-                  </a:outerShdw>
-                </a:effectLst>
-              </a14:hiddenEffects>
-            </a:ext>
-          </a:extLst>
         </p:spPr>
         <p:txBody>
           <a:bodyPr vert="horz" wrap="square" lIns="91440" tIns="45720" rIns="91440" bIns="45720" numCol="1" anchor="b" anchorCtr="0" compatLnSpc="1">
@@ -972,19 +773,14 @@
             </a:prstTxWarp>
           </a:bodyPr>
           <a:lstStyle>
-            <a:lvl1pPr algn="r" eaLnBrk="0" hangingPunct="0">
+            <a:lvl1pPr algn="r">
               <a:defRPr sz="1200"/>
             </a:lvl1pPr>
           </a:lstStyle>
           <a:p>
-            <a:pPr>
-              <a:defRPr/>
-            </a:pPr>
-            <a:fld id="{019AAE41-D8A6-4489-8927-544C394506CD}" type="slidenum">
+            <a:fld id="{AFD398D1-AA6A-4710-82C9-4DB298E588FE}" type="slidenum">
               <a:rPr lang="zh-CN" altLang="en-US"/>
-              <a:pPr>
-                <a:defRPr/>
-              </a:pPr>
+              <a:pPr/>
               <a:t>‹#›</a:t>
             </a:fld>
             <a:endParaRPr lang="en-US" altLang="zh-CN"/>
@@ -1162,6 +958,34 @@
         </p:nvSpPr>
         <p:spPr>
           <a:noFill/>
+          <a:extLst>
+            <a:ext uri="{909E8E84-426E-40DD-AFC4-6F175D3DCCD1}">
+              <a14:hiddenFill xmlns:a14="http://schemas.microsoft.com/office/drawing/2010/main">
+                <a:solidFill>
+                  <a:schemeClr val="accent1"/>
+                </a:solidFill>
+              </a14:hiddenFill>
+            </a:ext>
+            <a:ext uri="{91240B29-F687-4F45-9708-019B960494DF}">
+              <a14:hiddenLine xmlns:a14="http://schemas.microsoft.com/office/drawing/2010/main" w="9525">
+                <a:solidFill>
+                  <a:schemeClr val="tx1"/>
+                </a:solidFill>
+                <a:miter lim="800000"/>
+                <a:headEnd/>
+                <a:tailEnd/>
+              </a14:hiddenLine>
+            </a:ext>
+            <a:ext uri="{AF507438-7753-43E0-B8FC-AC1667EBCBE1}">
+              <a14:hiddenEffects xmlns:a14="http://schemas.microsoft.com/office/drawing/2010/main">
+                <a:effectLst>
+                  <a:outerShdw dist="35921" dir="2700000" algn="ctr" rotWithShape="0">
+                    <a:schemeClr val="bg2"/>
+                  </a:outerShdw>
+                </a:effectLst>
+              </a14:hiddenEffects>
+            </a:ext>
+          </a:extLst>
         </p:spPr>
         <p:txBody>
           <a:bodyPr/>
@@ -1183,6 +1007,34 @@
         </p:nvSpPr>
         <p:spPr>
           <a:noFill/>
+          <a:extLst>
+            <a:ext uri="{909E8E84-426E-40DD-AFC4-6F175D3DCCD1}">
+              <a14:hiddenFill xmlns:a14="http://schemas.microsoft.com/office/drawing/2010/main">
+                <a:solidFill>
+                  <a:schemeClr val="accent1"/>
+                </a:solidFill>
+              </a14:hiddenFill>
+            </a:ext>
+            <a:ext uri="{91240B29-F687-4F45-9708-019B960494DF}">
+              <a14:hiddenLine xmlns:a14="http://schemas.microsoft.com/office/drawing/2010/main" w="9525">
+                <a:solidFill>
+                  <a:schemeClr val="tx1"/>
+                </a:solidFill>
+                <a:miter lim="800000"/>
+                <a:headEnd/>
+                <a:tailEnd/>
+              </a14:hiddenLine>
+            </a:ext>
+            <a:ext uri="{AF507438-7753-43E0-B8FC-AC1667EBCBE1}">
+              <a14:hiddenEffects xmlns:a14="http://schemas.microsoft.com/office/drawing/2010/main">
+                <a:effectLst>
+                  <a:outerShdw dist="35921" dir="2700000" algn="ctr" rotWithShape="0">
+                    <a:schemeClr val="bg2"/>
+                  </a:outerShdw>
+                </a:effectLst>
+              </a14:hiddenEffects>
+            </a:ext>
+          </a:extLst>
         </p:spPr>
         <p:txBody>
           <a:bodyPr/>
@@ -1314,8 +1166,8 @@
                 <a:spcPct val="0"/>
               </a:spcBef>
             </a:pPr>
-            <a:fld id="{7B193809-D6A9-4850-A354-7E921B484842}" type="slidenum">
-              <a:rPr lang="zh-CN" altLang="en-US" smtClean="0">
+            <a:fld id="{EEF61EF2-62B2-4C54-B82F-C3D8F1DB8047}" type="slidenum">
+              <a:rPr lang="zh-CN" altLang="en-US">
                 <a:latin typeface="Arial" panose="020B0604020202020204" pitchFamily="34" charset="0"/>
               </a:rPr>
               <a:pPr>
@@ -1325,7 +1177,7 @@
               </a:pPr>
               <a:t>22</a:t>
             </a:fld>
-            <a:endParaRPr lang="en-US" altLang="zh-CN" smtClean="0">
+            <a:endParaRPr lang="en-US" altLang="zh-CN">
               <a:latin typeface="Arial" panose="020B0604020202020204" pitchFamily="34" charset="0"/>
             </a:endParaRPr>
           </a:p>
@@ -1382,6 +1234,34 @@
         </p:nvSpPr>
         <p:spPr>
           <a:noFill/>
+          <a:extLst>
+            <a:ext uri="{909E8E84-426E-40DD-AFC4-6F175D3DCCD1}">
+              <a14:hiddenFill xmlns:a14="http://schemas.microsoft.com/office/drawing/2010/main">
+                <a:solidFill>
+                  <a:schemeClr val="accent1"/>
+                </a:solidFill>
+              </a14:hiddenFill>
+            </a:ext>
+            <a:ext uri="{91240B29-F687-4F45-9708-019B960494DF}">
+              <a14:hiddenLine xmlns:a14="http://schemas.microsoft.com/office/drawing/2010/main" w="9525">
+                <a:solidFill>
+                  <a:schemeClr val="tx1"/>
+                </a:solidFill>
+                <a:miter lim="800000"/>
+                <a:headEnd/>
+                <a:tailEnd/>
+              </a14:hiddenLine>
+            </a:ext>
+            <a:ext uri="{AF507438-7753-43E0-B8FC-AC1667EBCBE1}">
+              <a14:hiddenEffects xmlns:a14="http://schemas.microsoft.com/office/drawing/2010/main">
+                <a:effectLst>
+                  <a:outerShdw dist="35921" dir="2700000" algn="ctr" rotWithShape="0">
+                    <a:schemeClr val="bg2"/>
+                  </a:outerShdw>
+                </a:effectLst>
+              </a14:hiddenEffects>
+            </a:ext>
+          </a:extLst>
         </p:spPr>
         <p:txBody>
           <a:bodyPr/>
@@ -1403,6 +1283,34 @@
         </p:nvSpPr>
         <p:spPr>
           <a:noFill/>
+          <a:extLst>
+            <a:ext uri="{909E8E84-426E-40DD-AFC4-6F175D3DCCD1}">
+              <a14:hiddenFill xmlns:a14="http://schemas.microsoft.com/office/drawing/2010/main">
+                <a:solidFill>
+                  <a:schemeClr val="accent1"/>
+                </a:solidFill>
+              </a14:hiddenFill>
+            </a:ext>
+            <a:ext uri="{91240B29-F687-4F45-9708-019B960494DF}">
+              <a14:hiddenLine xmlns:a14="http://schemas.microsoft.com/office/drawing/2010/main" w="9525">
+                <a:solidFill>
+                  <a:schemeClr val="tx1"/>
+                </a:solidFill>
+                <a:miter lim="800000"/>
+                <a:headEnd/>
+                <a:tailEnd/>
+              </a14:hiddenLine>
+            </a:ext>
+            <a:ext uri="{AF507438-7753-43E0-B8FC-AC1667EBCBE1}">
+              <a14:hiddenEffects xmlns:a14="http://schemas.microsoft.com/office/drawing/2010/main">
+                <a:effectLst>
+                  <a:outerShdw dist="35921" dir="2700000" algn="ctr" rotWithShape="0">
+                    <a:schemeClr val="bg2"/>
+                  </a:outerShdw>
+                </a:effectLst>
+              </a14:hiddenEffects>
+            </a:ext>
+          </a:extLst>
         </p:spPr>
         <p:txBody>
           <a:bodyPr/>
@@ -1534,8 +1442,8 @@
                 <a:spcPct val="0"/>
               </a:spcBef>
             </a:pPr>
-            <a:fld id="{D2A87392-4BEC-46F2-9C08-AE697ED2CAA7}" type="slidenum">
-              <a:rPr lang="zh-CN" altLang="en-US" smtClean="0">
+            <a:fld id="{E598FB4C-361D-4B02-82B3-63817083F99D}" type="slidenum">
+              <a:rPr lang="zh-CN" altLang="en-US">
                 <a:latin typeface="Arial" panose="020B0604020202020204" pitchFamily="34" charset="0"/>
               </a:rPr>
               <a:pPr>
@@ -1545,7 +1453,7 @@
               </a:pPr>
               <a:t>38</a:t>
             </a:fld>
-            <a:endParaRPr lang="en-US" altLang="zh-CN" smtClean="0">
+            <a:endParaRPr lang="en-US" altLang="zh-CN">
               <a:latin typeface="Arial" panose="020B0604020202020204" pitchFamily="34" charset="0"/>
             </a:endParaRPr>
           </a:p>
@@ -1591,7 +1499,7 @@
     </p:spTree>
     <p:extLst>
       <p:ext uri="{BB962C8B-B14F-4D97-AF65-F5344CB8AC3E}">
-        <p14:creationId xmlns:p14="http://schemas.microsoft.com/office/powerpoint/2010/main" val="3714258460"/>
+        <p14:creationId xmlns:p14="http://schemas.microsoft.com/office/powerpoint/2010/main" val="1046803320"/>
       </p:ext>
     </p:extLst>
   </p:cSld>
@@ -1697,7 +1605,7 @@
     </p:spTree>
     <p:extLst>
       <p:ext uri="{BB962C8B-B14F-4D97-AF65-F5344CB8AC3E}">
-        <p14:creationId xmlns:p14="http://schemas.microsoft.com/office/powerpoint/2010/main" val="2283125460"/>
+        <p14:creationId xmlns:p14="http://schemas.microsoft.com/office/powerpoint/2010/main" val="3452406727"/>
       </p:ext>
     </p:extLst>
   </p:cSld>
@@ -1813,7 +1721,7 @@
     </p:spTree>
     <p:extLst>
       <p:ext uri="{BB962C8B-B14F-4D97-AF65-F5344CB8AC3E}">
-        <p14:creationId xmlns:p14="http://schemas.microsoft.com/office/powerpoint/2010/main" val="3104301197"/>
+        <p14:creationId xmlns:p14="http://schemas.microsoft.com/office/powerpoint/2010/main" val="118538989"/>
       </p:ext>
     </p:extLst>
   </p:cSld>
@@ -1898,7 +1806,7 @@
     </p:spTree>
     <p:extLst>
       <p:ext uri="{BB962C8B-B14F-4D97-AF65-F5344CB8AC3E}">
-        <p14:creationId xmlns:p14="http://schemas.microsoft.com/office/powerpoint/2010/main" val="668720997"/>
+        <p14:creationId xmlns:p14="http://schemas.microsoft.com/office/powerpoint/2010/main" val="60283120"/>
       </p:ext>
     </p:extLst>
   </p:cSld>
@@ -2070,7 +1978,7 @@
     </p:spTree>
     <p:extLst>
       <p:ext uri="{BB962C8B-B14F-4D97-AF65-F5344CB8AC3E}">
-        <p14:creationId xmlns:p14="http://schemas.microsoft.com/office/powerpoint/2010/main" val="56653097"/>
+        <p14:creationId xmlns:p14="http://schemas.microsoft.com/office/powerpoint/2010/main" val="3335484995"/>
       </p:ext>
     </p:extLst>
   </p:cSld>
@@ -2176,7 +2084,7 @@
     </p:spTree>
     <p:extLst>
       <p:ext uri="{BB962C8B-B14F-4D97-AF65-F5344CB8AC3E}">
-        <p14:creationId xmlns:p14="http://schemas.microsoft.com/office/powerpoint/2010/main" val="3615434721"/>
+        <p14:creationId xmlns:p14="http://schemas.microsoft.com/office/powerpoint/2010/main" val="4122706414"/>
       </p:ext>
     </p:extLst>
   </p:cSld>
@@ -2305,7 +2213,7 @@
     </p:spTree>
     <p:extLst>
       <p:ext uri="{BB962C8B-B14F-4D97-AF65-F5344CB8AC3E}">
-        <p14:creationId xmlns:p14="http://schemas.microsoft.com/office/powerpoint/2010/main" val="1229749102"/>
+        <p14:creationId xmlns:p14="http://schemas.microsoft.com/office/powerpoint/2010/main" val="1477691439"/>
       </p:ext>
     </p:extLst>
   </p:cSld>
@@ -2528,7 +2436,7 @@
     </p:spTree>
     <p:extLst>
       <p:ext uri="{BB962C8B-B14F-4D97-AF65-F5344CB8AC3E}">
-        <p14:creationId xmlns:p14="http://schemas.microsoft.com/office/powerpoint/2010/main" val="1496734738"/>
+        <p14:creationId xmlns:p14="http://schemas.microsoft.com/office/powerpoint/2010/main" val="786817428"/>
       </p:ext>
     </p:extLst>
   </p:cSld>
@@ -2890,7 +2798,7 @@
     </p:spTree>
     <p:extLst>
       <p:ext uri="{BB962C8B-B14F-4D97-AF65-F5344CB8AC3E}">
-        <p14:creationId xmlns:p14="http://schemas.microsoft.com/office/powerpoint/2010/main" val="2778039974"/>
+        <p14:creationId xmlns:p14="http://schemas.microsoft.com/office/powerpoint/2010/main" val="2442814644"/>
       </p:ext>
     </p:extLst>
   </p:cSld>
@@ -2945,7 +2853,7 @@
     </p:spTree>
     <p:extLst>
       <p:ext uri="{BB962C8B-B14F-4D97-AF65-F5344CB8AC3E}">
-        <p14:creationId xmlns:p14="http://schemas.microsoft.com/office/powerpoint/2010/main" val="824082744"/>
+        <p14:creationId xmlns:p14="http://schemas.microsoft.com/office/powerpoint/2010/main" val="3734870231"/>
       </p:ext>
     </p:extLst>
   </p:cSld>
@@ -2978,7 +2886,7 @@
     </p:spTree>
     <p:extLst>
       <p:ext uri="{BB962C8B-B14F-4D97-AF65-F5344CB8AC3E}">
-        <p14:creationId xmlns:p14="http://schemas.microsoft.com/office/powerpoint/2010/main" val="1837272557"/>
+        <p14:creationId xmlns:p14="http://schemas.microsoft.com/office/powerpoint/2010/main" val="532014919"/>
       </p:ext>
     </p:extLst>
   </p:cSld>
@@ -3191,7 +3099,7 @@
     </p:spTree>
     <p:extLst>
       <p:ext uri="{BB962C8B-B14F-4D97-AF65-F5344CB8AC3E}">
-        <p14:creationId xmlns:p14="http://schemas.microsoft.com/office/powerpoint/2010/main" val="1955616108"/>
+        <p14:creationId xmlns:p14="http://schemas.microsoft.com/office/powerpoint/2010/main" val="47663786"/>
       </p:ext>
     </p:extLst>
   </p:cSld>
@@ -3382,7 +3290,7 @@
     </p:spTree>
     <p:extLst>
       <p:ext uri="{BB962C8B-B14F-4D97-AF65-F5344CB8AC3E}">
-        <p14:creationId xmlns:p14="http://schemas.microsoft.com/office/powerpoint/2010/main" val="2733358550"/>
+        <p14:creationId xmlns:p14="http://schemas.microsoft.com/office/powerpoint/2010/main" val="926881179"/>
       </p:ext>
     </p:extLst>
   </p:cSld>
@@ -3572,19 +3480,19 @@
   </p:cSld>
   <p:clrMap bg1="lt1" tx1="dk1" bg2="lt2" tx2="dk2" accent1="accent1" accent2="accent2" accent3="accent3" accent4="accent4" accent5="accent5" accent6="accent6" hlink="hlink" folHlink="folHlink"/>
   <p:sldLayoutIdLst>
-    <p:sldLayoutId id="2147484264" r:id="rId1"/>
-    <p:sldLayoutId id="2147484252" r:id="rId2"/>
-    <p:sldLayoutId id="2147484253" r:id="rId3"/>
-    <p:sldLayoutId id="2147484254" r:id="rId4"/>
-    <p:sldLayoutId id="2147484255" r:id="rId5"/>
-    <p:sldLayoutId id="2147484256" r:id="rId6"/>
-    <p:sldLayoutId id="2147484257" r:id="rId7"/>
-    <p:sldLayoutId id="2147484258" r:id="rId8"/>
-    <p:sldLayoutId id="2147484259" r:id="rId9"/>
-    <p:sldLayoutId id="2147484260" r:id="rId10"/>
-    <p:sldLayoutId id="2147484261" r:id="rId11"/>
-    <p:sldLayoutId id="2147484262" r:id="rId12"/>
-    <p:sldLayoutId id="2147484263" r:id="rId13"/>
+    <p:sldLayoutId id="2147484306" r:id="rId1"/>
+    <p:sldLayoutId id="2147484294" r:id="rId2"/>
+    <p:sldLayoutId id="2147484295" r:id="rId3"/>
+    <p:sldLayoutId id="2147484296" r:id="rId4"/>
+    <p:sldLayoutId id="2147484297" r:id="rId5"/>
+    <p:sldLayoutId id="2147484298" r:id="rId6"/>
+    <p:sldLayoutId id="2147484299" r:id="rId7"/>
+    <p:sldLayoutId id="2147484300" r:id="rId8"/>
+    <p:sldLayoutId id="2147484301" r:id="rId9"/>
+    <p:sldLayoutId id="2147484302" r:id="rId10"/>
+    <p:sldLayoutId id="2147484303" r:id="rId11"/>
+    <p:sldLayoutId id="2147484304" r:id="rId12"/>
+    <p:sldLayoutId id="2147484305" r:id="rId13"/>
   </p:sldLayoutIdLst>
   <p:transition>
     <p:fade/>
@@ -4054,13 +3962,7 @@
       </p:pic>
       <p:sp>
         <p:nvSpPr>
-          <p:cNvPr id="4" name="Rectangle 9">
-            <a:extLst>
-              <a:ext uri="{FF2B5EF4-FFF2-40B4-BE49-F238E27FC236}">
-                <a16:creationId xmlns:a16="http://schemas.microsoft.com/office/drawing/2014/main" id="{BD2795DE-07FD-4E6E-96BD-4BE928C6921B}"/>
-              </a:ext>
-            </a:extLst>
-          </p:cNvPr>
+          <p:cNvPr id="4" name="Rectangle 9"/>
           <p:cNvSpPr>
             <a:spLocks noChangeArrowheads="1"/>
           </p:cNvSpPr>
@@ -4078,25 +3980,6 @@
           <a:ln>
             <a:noFill/>
           </a:ln>
-          <a:extLst>
-            <a:ext uri="{909E8E84-426E-40DD-AFC4-6F175D3DCCD1}">
-              <a14:hiddenFill xmlns:a14="http://schemas.microsoft.com/office/drawing/2010/main">
-                <a:solidFill>
-                  <a:srgbClr val="FFFFFF"/>
-                </a:solidFill>
-              </a14:hiddenFill>
-            </a:ext>
-            <a:ext uri="{91240B29-F687-4F45-9708-019B960494DF}">
-              <a14:hiddenLine xmlns:a14="http://schemas.microsoft.com/office/drawing/2010/main" w="9525">
-                <a:solidFill>
-                  <a:srgbClr val="000000"/>
-                </a:solidFill>
-                <a:miter lim="800000"/>
-                <a:headEnd/>
-                <a:tailEnd/>
-              </a14:hiddenLine>
-            </a:ext>
-          </a:extLst>
         </p:spPr>
         <p:txBody>
           <a:bodyPr anchor="ctr"/>
@@ -4262,13 +4145,7 @@
       </p:sp>
       <p:sp>
         <p:nvSpPr>
-          <p:cNvPr id="5" name="Rectangle 9">
-            <a:extLst>
-              <a:ext uri="{FF2B5EF4-FFF2-40B4-BE49-F238E27FC236}">
-                <a16:creationId xmlns:a16="http://schemas.microsoft.com/office/drawing/2014/main" id="{807BDEEC-0BB9-475F-8BE7-A47E248C5FD9}"/>
-              </a:ext>
-            </a:extLst>
-          </p:cNvPr>
+          <p:cNvPr id="5" name="Rectangle 9"/>
           <p:cNvSpPr>
             <a:spLocks noChangeArrowheads="1"/>
           </p:cNvSpPr>
@@ -4286,25 +4163,6 @@
           <a:ln>
             <a:noFill/>
           </a:ln>
-          <a:extLst>
-            <a:ext uri="{909E8E84-426E-40DD-AFC4-6F175D3DCCD1}">
-              <a14:hiddenFill xmlns:a14="http://schemas.microsoft.com/office/drawing/2010/main">
-                <a:solidFill>
-                  <a:srgbClr val="FFFFFF"/>
-                </a:solidFill>
-              </a14:hiddenFill>
-            </a:ext>
-            <a:ext uri="{91240B29-F687-4F45-9708-019B960494DF}">
-              <a14:hiddenLine xmlns:a14="http://schemas.microsoft.com/office/drawing/2010/main" w="9525">
-                <a:solidFill>
-                  <a:srgbClr val="000000"/>
-                </a:solidFill>
-                <a:miter lim="800000"/>
-                <a:headEnd/>
-                <a:tailEnd/>
-              </a14:hiddenLine>
-            </a:ext>
-          </a:extLst>
         </p:spPr>
         <p:txBody>
           <a:bodyPr anchor="ctr"/>
@@ -4505,13 +4363,7 @@
       </p:grpSpPr>
       <p:sp>
         <p:nvSpPr>
-          <p:cNvPr id="12290" name="标题 1">
-            <a:extLst>
-              <a:ext uri="{FF2B5EF4-FFF2-40B4-BE49-F238E27FC236}">
-                <a16:creationId xmlns:a16="http://schemas.microsoft.com/office/drawing/2014/main" id="{E4B4086C-CFE4-4F46-8E5C-82CDFD86B656}"/>
-              </a:ext>
-            </a:extLst>
-          </p:cNvPr>
+          <p:cNvPr id="12290" name="标题 1"/>
           <p:cNvSpPr>
             <a:spLocks noGrp="1"/>
           </p:cNvSpPr>
@@ -5150,13 +5002,7 @@
       </p:sp>
       <p:sp>
         <p:nvSpPr>
-          <p:cNvPr id="8" name="Text Box 6">
-            <a:extLst>
-              <a:ext uri="{FF2B5EF4-FFF2-40B4-BE49-F238E27FC236}">
-                <a16:creationId xmlns:a16="http://schemas.microsoft.com/office/drawing/2014/main" id="{7552E327-3E32-41F5-9816-8E149642B150}"/>
-              </a:ext>
-            </a:extLst>
-          </p:cNvPr>
+          <p:cNvPr id="8" name="Text Box 6"/>
           <p:cNvSpPr txBox="1">
             <a:spLocks noChangeArrowheads="1"/>
           </p:cNvSpPr>
@@ -5638,13 +5484,7 @@
         </p:grpSpPr>
         <p:sp>
           <p:nvSpPr>
-            <p:cNvPr id="12" name="Text Box 10">
-              <a:extLst>
-                <a:ext uri="{FF2B5EF4-FFF2-40B4-BE49-F238E27FC236}">
-                  <a16:creationId xmlns:a16="http://schemas.microsoft.com/office/drawing/2014/main" id="{AF4E1598-AE6F-4F0D-927C-50C5646BBC75}"/>
-                </a:ext>
-              </a:extLst>
-            </p:cNvPr>
+            <p:cNvPr id="12" name="Text Box 10"/>
             <p:cNvSpPr txBox="1">
               <a:spLocks noChangeArrowheads="1"/>
             </p:cNvSpPr>
@@ -6509,13 +6349,7 @@
       </p:sp>
       <p:sp>
         <p:nvSpPr>
-          <p:cNvPr id="25" name="Rectangle 25">
-            <a:extLst>
-              <a:ext uri="{FF2B5EF4-FFF2-40B4-BE49-F238E27FC236}">
-                <a16:creationId xmlns:a16="http://schemas.microsoft.com/office/drawing/2014/main" id="{961C1D93-1820-4E41-ADA8-9ED07E08B637}"/>
-              </a:ext>
-            </a:extLst>
-          </p:cNvPr>
+          <p:cNvPr id="25" name="Rectangle 25"/>
           <p:cNvSpPr>
             <a:spLocks noChangeArrowheads="1"/>
           </p:cNvSpPr>
@@ -8178,13 +8012,7 @@
       </p:sp>
       <p:sp>
         <p:nvSpPr>
-          <p:cNvPr id="22531" name="内容占位符 2">
-            <a:extLst>
-              <a:ext uri="{FF2B5EF4-FFF2-40B4-BE49-F238E27FC236}">
-                <a16:creationId xmlns:a16="http://schemas.microsoft.com/office/drawing/2014/main" id="{E000A078-F491-4482-869D-66001442877B}"/>
-              </a:ext>
-            </a:extLst>
-          </p:cNvPr>
+          <p:cNvPr id="22531" name="内容占位符 2"/>
           <p:cNvSpPr>
             <a:spLocks noGrp="1" noChangeArrowheads="1"/>
           </p:cNvSpPr>
@@ -8607,13 +8435,7 @@
       </p:sp>
       <p:sp>
         <p:nvSpPr>
-          <p:cNvPr id="23555" name="内容占位符 2">
-            <a:extLst>
-              <a:ext uri="{FF2B5EF4-FFF2-40B4-BE49-F238E27FC236}">
-                <a16:creationId xmlns:a16="http://schemas.microsoft.com/office/drawing/2014/main" id="{AD56ABD3-3935-41C3-A9CD-FB0DC34D3802}"/>
-              </a:ext>
-            </a:extLst>
-          </p:cNvPr>
+          <p:cNvPr id="23555" name="内容占位符 2"/>
           <p:cNvSpPr>
             <a:spLocks noGrp="1" noChangeArrowheads="1"/>
           </p:cNvSpPr>
@@ -9031,7 +8853,7 @@
       </p:sp>
       <p:pic>
         <p:nvPicPr>
-          <p:cNvPr id="17412" name="Picture 2"/>
+          <p:cNvPr id="17412" name="图片 1"/>
           <p:cNvPicPr>
             <a:picLocks noChangeAspect="1" noChangeArrowheads="1"/>
           </p:cNvPicPr>
@@ -9052,8 +8874,8 @@
         </p:blipFill>
         <p:spPr bwMode="auto">
           <a:xfrm>
-            <a:off x="1412875" y="1412875"/>
-            <a:ext cx="9291638" cy="3881438"/>
+            <a:off x="1525588" y="1700213"/>
+            <a:ext cx="9140825" cy="3932237"/>
           </a:xfrm>
           <a:prstGeom prst="rect">
             <a:avLst/>
@@ -9062,33 +8884,23 @@
           <a:ln>
             <a:noFill/>
           </a:ln>
-          <a:effectLst/>
           <a:extLst>
             <a:ext uri="{909E8E84-426E-40DD-AFC4-6F175D3DCCD1}">
               <a14:hiddenFill xmlns:a14="http://schemas.microsoft.com/office/drawing/2010/main">
                 <a:solidFill>
-                  <a:schemeClr val="accent1"/>
+                  <a:srgbClr val="FFFFFF"/>
                 </a:solidFill>
               </a14:hiddenFill>
             </a:ext>
             <a:ext uri="{91240B29-F687-4F45-9708-019B960494DF}">
               <a14:hiddenLine xmlns:a14="http://schemas.microsoft.com/office/drawing/2010/main" w="9525">
                 <a:solidFill>
-                  <a:schemeClr val="tx1"/>
+                  <a:srgbClr val="000000"/>
                 </a:solidFill>
                 <a:miter lim="800000"/>
                 <a:headEnd/>
                 <a:tailEnd/>
               </a14:hiddenLine>
-            </a:ext>
-            <a:ext uri="{AF507438-7753-43E0-B8FC-AC1667EBCBE1}">
-              <a14:hiddenEffects xmlns:a14="http://schemas.microsoft.com/office/drawing/2010/main">
-                <a:effectLst>
-                  <a:outerShdw dist="35921" dir="2700000" algn="ctr" rotWithShape="0">
-                    <a:schemeClr val="bg2"/>
-                  </a:outerShdw>
-                </a:effectLst>
-              </a14:hiddenEffects>
             </a:ext>
           </a:extLst>
         </p:spPr>
@@ -12465,13 +12277,7 @@
       </p:sp>
       <p:sp>
         <p:nvSpPr>
-          <p:cNvPr id="34" name="Text Box 36">
-            <a:extLst>
-              <a:ext uri="{FF2B5EF4-FFF2-40B4-BE49-F238E27FC236}">
-                <a16:creationId xmlns:a16="http://schemas.microsoft.com/office/drawing/2014/main" id="{7AAD3451-E2D1-475B-A226-D20D04B5ED92}"/>
-              </a:ext>
-            </a:extLst>
-          </p:cNvPr>
+          <p:cNvPr id="34" name="Text Box 36"/>
           <p:cNvSpPr txBox="1">
             <a:spLocks noChangeArrowheads="1"/>
           </p:cNvSpPr>
@@ -12546,13 +12352,7 @@
       </p:sp>
       <p:sp>
         <p:nvSpPr>
-          <p:cNvPr id="35" name="Rectangle 37">
-            <a:extLst>
-              <a:ext uri="{FF2B5EF4-FFF2-40B4-BE49-F238E27FC236}">
-                <a16:creationId xmlns:a16="http://schemas.microsoft.com/office/drawing/2014/main" id="{123FCC99-5B6E-4D4F-8DAD-0196C591E914}"/>
-              </a:ext>
-            </a:extLst>
-          </p:cNvPr>
+          <p:cNvPr id="35" name="Rectangle 37"/>
           <p:cNvSpPr>
             <a:spLocks noChangeArrowheads="1"/>
           </p:cNvSpPr>
@@ -14975,13 +14775,7 @@
       </p:sp>
       <p:sp>
         <p:nvSpPr>
-          <p:cNvPr id="9" name="Rectangle 54">
-            <a:extLst>
-              <a:ext uri="{FF2B5EF4-FFF2-40B4-BE49-F238E27FC236}">
-                <a16:creationId xmlns:a16="http://schemas.microsoft.com/office/drawing/2014/main" id="{F3C73E25-92F7-4EFE-A907-0D99D45613C0}"/>
-              </a:ext>
-            </a:extLst>
-          </p:cNvPr>
+          <p:cNvPr id="9" name="Rectangle 54"/>
           <p:cNvSpPr>
             <a:spLocks noChangeArrowheads="1"/>
           </p:cNvSpPr>
@@ -15511,13 +15305,7 @@
       </p:sp>
       <p:sp>
         <p:nvSpPr>
-          <p:cNvPr id="13" name="Text Box 61">
-            <a:extLst>
-              <a:ext uri="{FF2B5EF4-FFF2-40B4-BE49-F238E27FC236}">
-                <a16:creationId xmlns:a16="http://schemas.microsoft.com/office/drawing/2014/main" id="{7105153D-97F3-428D-A99F-EA774AB4AB33}"/>
-              </a:ext>
-            </a:extLst>
-          </p:cNvPr>
+          <p:cNvPr id="13" name="Text Box 61"/>
           <p:cNvSpPr txBox="1">
             <a:spLocks noChangeArrowheads="1"/>
           </p:cNvSpPr>
@@ -17890,13 +17678,7 @@
       </p:sp>
       <p:grpSp>
         <p:nvGrpSpPr>
-          <p:cNvPr id="4" name="Group 4">
-            <a:extLst>
-              <a:ext uri="{FF2B5EF4-FFF2-40B4-BE49-F238E27FC236}">
-                <a16:creationId xmlns:a16="http://schemas.microsoft.com/office/drawing/2014/main" id="{1B5BB8E8-B0B6-4ADA-89EB-57064739677F}"/>
-              </a:ext>
-            </a:extLst>
-          </p:cNvPr>
+          <p:cNvPr id="4" name="Group 4"/>
           <p:cNvGrpSpPr>
             <a:grpSpLocks/>
           </p:cNvGrpSpPr>
@@ -17915,13 +17697,7 @@
         </p:grpSpPr>
         <p:grpSp>
           <p:nvGrpSpPr>
-            <p:cNvPr id="5" name="Group 5">
-              <a:extLst>
-                <a:ext uri="{FF2B5EF4-FFF2-40B4-BE49-F238E27FC236}">
-                  <a16:creationId xmlns:a16="http://schemas.microsoft.com/office/drawing/2014/main" id="{102513D7-025C-413F-82C6-1BE51914F48A}"/>
-                </a:ext>
-              </a:extLst>
-            </p:cNvPr>
+            <p:cNvPr id="5" name="Group 5"/>
             <p:cNvGrpSpPr>
               <a:grpSpLocks/>
             </p:cNvGrpSpPr>
@@ -17938,13 +17714,7 @@
           </p:grpSpPr>
           <p:sp>
             <p:nvSpPr>
-              <p:cNvPr id="14" name="Oval 6">
-                <a:extLst>
-                  <a:ext uri="{FF2B5EF4-FFF2-40B4-BE49-F238E27FC236}">
-                    <a16:creationId xmlns:a16="http://schemas.microsoft.com/office/drawing/2014/main" id="{3D24EEBB-73D0-451C-A397-05B90FEBD9C5}"/>
-                  </a:ext>
-                </a:extLst>
-              </p:cNvPr>
+              <p:cNvPr id="14" name="Oval 6"/>
               <p:cNvSpPr>
                 <a:spLocks noChangeArrowheads="1"/>
               </p:cNvSpPr>
@@ -17989,13 +17759,7 @@
           </p:sp>
           <p:sp>
             <p:nvSpPr>
-              <p:cNvPr id="15" name="Oval 7">
-                <a:extLst>
-                  <a:ext uri="{FF2B5EF4-FFF2-40B4-BE49-F238E27FC236}">
-                    <a16:creationId xmlns:a16="http://schemas.microsoft.com/office/drawing/2014/main" id="{282A0FC9-1077-4FCA-8F9B-7BE1DBA02271}"/>
-                  </a:ext>
-                </a:extLst>
-              </p:cNvPr>
+              <p:cNvPr id="15" name="Oval 7"/>
               <p:cNvSpPr>
                 <a:spLocks noChangeArrowheads="1"/>
               </p:cNvSpPr>
@@ -18040,13 +17804,7 @@
           </p:sp>
           <p:sp>
             <p:nvSpPr>
-              <p:cNvPr id="16" name="Oval 8">
-                <a:extLst>
-                  <a:ext uri="{FF2B5EF4-FFF2-40B4-BE49-F238E27FC236}">
-                    <a16:creationId xmlns:a16="http://schemas.microsoft.com/office/drawing/2014/main" id="{1783E067-6F52-4DDD-B654-8396D9EBAEF3}"/>
-                  </a:ext>
-                </a:extLst>
-              </p:cNvPr>
+              <p:cNvPr id="16" name="Oval 8"/>
               <p:cNvSpPr>
                 <a:spLocks noChangeArrowheads="1"/>
               </p:cNvSpPr>
@@ -18091,13 +17849,7 @@
           </p:sp>
           <p:sp>
             <p:nvSpPr>
-              <p:cNvPr id="17" name="Oval 9">
-                <a:extLst>
-                  <a:ext uri="{FF2B5EF4-FFF2-40B4-BE49-F238E27FC236}">
-                    <a16:creationId xmlns:a16="http://schemas.microsoft.com/office/drawing/2014/main" id="{10328853-9352-4E90-A04A-9379E2DBDADB}"/>
-                  </a:ext>
-                </a:extLst>
-              </p:cNvPr>
+              <p:cNvPr id="17" name="Oval 9"/>
               <p:cNvSpPr>
                 <a:spLocks noChangeArrowheads="1"/>
               </p:cNvSpPr>
@@ -18142,13 +17894,7 @@
           </p:sp>
           <p:sp>
             <p:nvSpPr>
-              <p:cNvPr id="18" name="Oval 10">
-                <a:extLst>
-                  <a:ext uri="{FF2B5EF4-FFF2-40B4-BE49-F238E27FC236}">
-                    <a16:creationId xmlns:a16="http://schemas.microsoft.com/office/drawing/2014/main" id="{92D8C4A8-21BC-4399-973E-FB99D481057D}"/>
-                  </a:ext>
-                </a:extLst>
-              </p:cNvPr>
+              <p:cNvPr id="18" name="Oval 10"/>
               <p:cNvSpPr>
                 <a:spLocks noChangeArrowheads="1"/>
               </p:cNvSpPr>
@@ -18193,13 +17939,7 @@
           </p:sp>
           <p:sp>
             <p:nvSpPr>
-              <p:cNvPr id="19" name="Oval 11">
-                <a:extLst>
-                  <a:ext uri="{FF2B5EF4-FFF2-40B4-BE49-F238E27FC236}">
-                    <a16:creationId xmlns:a16="http://schemas.microsoft.com/office/drawing/2014/main" id="{14C3E611-DEDB-4216-8FB2-492B6AA9AF1B}"/>
-                  </a:ext>
-                </a:extLst>
-              </p:cNvPr>
+              <p:cNvPr id="19" name="Oval 11"/>
               <p:cNvSpPr>
                 <a:spLocks noChangeArrowheads="1"/>
               </p:cNvSpPr>
@@ -18244,13 +17984,7 @@
           </p:sp>
           <p:sp>
             <p:nvSpPr>
-              <p:cNvPr id="20" name="Oval 12">
-                <a:extLst>
-                  <a:ext uri="{FF2B5EF4-FFF2-40B4-BE49-F238E27FC236}">
-                    <a16:creationId xmlns:a16="http://schemas.microsoft.com/office/drawing/2014/main" id="{CAEB807E-9CF6-4A83-99CE-3699C0622D1F}"/>
-                  </a:ext>
-                </a:extLst>
-              </p:cNvPr>
+              <p:cNvPr id="20" name="Oval 12"/>
               <p:cNvSpPr>
                 <a:spLocks noChangeArrowheads="1"/>
               </p:cNvSpPr>
@@ -18295,13 +18029,7 @@
           </p:sp>
           <p:sp>
             <p:nvSpPr>
-              <p:cNvPr id="21" name="Oval 13">
-                <a:extLst>
-                  <a:ext uri="{FF2B5EF4-FFF2-40B4-BE49-F238E27FC236}">
-                    <a16:creationId xmlns:a16="http://schemas.microsoft.com/office/drawing/2014/main" id="{DDD3D411-E8A2-4C0D-9C00-F7E13E1931F3}"/>
-                  </a:ext>
-                </a:extLst>
-              </p:cNvPr>
+              <p:cNvPr id="21" name="Oval 13"/>
               <p:cNvSpPr>
                 <a:spLocks noChangeArrowheads="1"/>
               </p:cNvSpPr>
@@ -18346,13 +18074,7 @@
           </p:sp>
           <p:sp>
             <p:nvSpPr>
-              <p:cNvPr id="22" name="Oval 14">
-                <a:extLst>
-                  <a:ext uri="{FF2B5EF4-FFF2-40B4-BE49-F238E27FC236}">
-                    <a16:creationId xmlns:a16="http://schemas.microsoft.com/office/drawing/2014/main" id="{99DD2394-86CF-4676-8D45-9BE8AF726009}"/>
-                  </a:ext>
-                </a:extLst>
-              </p:cNvPr>
+              <p:cNvPr id="22" name="Oval 14"/>
               <p:cNvSpPr>
                 <a:spLocks noChangeArrowheads="1"/>
               </p:cNvSpPr>
@@ -18397,13 +18119,7 @@
           </p:sp>
           <p:sp>
             <p:nvSpPr>
-              <p:cNvPr id="23" name="Oval 15">
-                <a:extLst>
-                  <a:ext uri="{FF2B5EF4-FFF2-40B4-BE49-F238E27FC236}">
-                    <a16:creationId xmlns:a16="http://schemas.microsoft.com/office/drawing/2014/main" id="{E3AC86C2-40DE-47B5-A116-34891DC44B2C}"/>
-                  </a:ext>
-                </a:extLst>
-              </p:cNvPr>
+              <p:cNvPr id="23" name="Oval 15"/>
               <p:cNvSpPr>
                 <a:spLocks noChangeArrowheads="1"/>
               </p:cNvSpPr>
@@ -18448,13 +18164,7 @@
           </p:sp>
           <p:sp>
             <p:nvSpPr>
-              <p:cNvPr id="24" name="Oval 16">
-                <a:extLst>
-                  <a:ext uri="{FF2B5EF4-FFF2-40B4-BE49-F238E27FC236}">
-                    <a16:creationId xmlns:a16="http://schemas.microsoft.com/office/drawing/2014/main" id="{D4CBE7EF-E367-4281-8E2D-A8C9C2FBB1A3}"/>
-                  </a:ext>
-                </a:extLst>
-              </p:cNvPr>
+              <p:cNvPr id="24" name="Oval 16"/>
               <p:cNvSpPr>
                 <a:spLocks noChangeArrowheads="1"/>
               </p:cNvSpPr>
@@ -18499,13 +18209,7 @@
           </p:sp>
           <p:sp>
             <p:nvSpPr>
-              <p:cNvPr id="25" name="Oval 17">
-                <a:extLst>
-                  <a:ext uri="{FF2B5EF4-FFF2-40B4-BE49-F238E27FC236}">
-                    <a16:creationId xmlns:a16="http://schemas.microsoft.com/office/drawing/2014/main" id="{42A8EFF5-F015-45B0-BD85-C19666AA6943}"/>
-                  </a:ext>
-                </a:extLst>
-              </p:cNvPr>
+              <p:cNvPr id="25" name="Oval 17"/>
               <p:cNvSpPr>
                 <a:spLocks noChangeArrowheads="1"/>
               </p:cNvSpPr>
@@ -18550,13 +18254,7 @@
           </p:sp>
           <p:sp>
             <p:nvSpPr>
-              <p:cNvPr id="26" name="Oval 18">
-                <a:extLst>
-                  <a:ext uri="{FF2B5EF4-FFF2-40B4-BE49-F238E27FC236}">
-                    <a16:creationId xmlns:a16="http://schemas.microsoft.com/office/drawing/2014/main" id="{7214B70F-EBAF-45DD-B3DE-DD455436E171}"/>
-                  </a:ext>
-                </a:extLst>
-              </p:cNvPr>
+              <p:cNvPr id="26" name="Oval 18"/>
               <p:cNvSpPr>
                 <a:spLocks noChangeArrowheads="1"/>
               </p:cNvSpPr>
@@ -18601,13 +18299,7 @@
           </p:sp>
           <p:cxnSp>
             <p:nvCxnSpPr>
-              <p:cNvPr id="27" name="AutoShape 19">
-                <a:extLst>
-                  <a:ext uri="{FF2B5EF4-FFF2-40B4-BE49-F238E27FC236}">
-                    <a16:creationId xmlns:a16="http://schemas.microsoft.com/office/drawing/2014/main" id="{CD1057BD-8DFE-4492-B0CC-A8EB32D30F62}"/>
-                  </a:ext>
-                </a:extLst>
-              </p:cNvPr>
+              <p:cNvPr id="27" name="AutoShape 19"/>
               <p:cNvCxnSpPr>
                 <a:cxnSpLocks noChangeShapeType="1"/>
                 <a:stCxn id="14" idx="3"/>
@@ -18637,13 +18329,7 @@
           </p:cxnSp>
           <p:cxnSp>
             <p:nvCxnSpPr>
-              <p:cNvPr id="28" name="AutoShape 20">
-                <a:extLst>
-                  <a:ext uri="{FF2B5EF4-FFF2-40B4-BE49-F238E27FC236}">
-                    <a16:creationId xmlns:a16="http://schemas.microsoft.com/office/drawing/2014/main" id="{07EC5B73-897E-47C0-A548-FD6B6CD63016}"/>
-                  </a:ext>
-                </a:extLst>
-              </p:cNvPr>
+              <p:cNvPr id="28" name="AutoShape 20"/>
               <p:cNvCxnSpPr>
                 <a:cxnSpLocks noChangeShapeType="1"/>
                 <a:stCxn id="14" idx="4"/>
@@ -18673,13 +18359,7 @@
           </p:cxnSp>
           <p:cxnSp>
             <p:nvCxnSpPr>
-              <p:cNvPr id="29" name="AutoShape 21">
-                <a:extLst>
-                  <a:ext uri="{FF2B5EF4-FFF2-40B4-BE49-F238E27FC236}">
-                    <a16:creationId xmlns:a16="http://schemas.microsoft.com/office/drawing/2014/main" id="{7C715FF3-0DCD-4B78-9B09-B234CFCB8CAF}"/>
-                  </a:ext>
-                </a:extLst>
-              </p:cNvPr>
+              <p:cNvPr id="29" name="AutoShape 21"/>
               <p:cNvCxnSpPr>
                 <a:cxnSpLocks noChangeShapeType="1"/>
                 <a:stCxn id="14" idx="5"/>
@@ -18709,13 +18389,7 @@
           </p:cxnSp>
           <p:cxnSp>
             <p:nvCxnSpPr>
-              <p:cNvPr id="30" name="AutoShape 22">
-                <a:extLst>
-                  <a:ext uri="{FF2B5EF4-FFF2-40B4-BE49-F238E27FC236}">
-                    <a16:creationId xmlns:a16="http://schemas.microsoft.com/office/drawing/2014/main" id="{68804F5A-C384-47FC-AC8B-DDF5C97C01CE}"/>
-                  </a:ext>
-                </a:extLst>
-              </p:cNvPr>
+              <p:cNvPr id="30" name="AutoShape 22"/>
               <p:cNvCxnSpPr>
                 <a:cxnSpLocks noChangeShapeType="1"/>
                 <a:stCxn id="15" idx="3"/>
@@ -18745,13 +18419,7 @@
           </p:cxnSp>
           <p:cxnSp>
             <p:nvCxnSpPr>
-              <p:cNvPr id="31" name="AutoShape 23">
-                <a:extLst>
-                  <a:ext uri="{FF2B5EF4-FFF2-40B4-BE49-F238E27FC236}">
-                    <a16:creationId xmlns:a16="http://schemas.microsoft.com/office/drawing/2014/main" id="{82914926-3C69-45DB-895D-6B097E108F2E}"/>
-                  </a:ext>
-                </a:extLst>
-              </p:cNvPr>
+              <p:cNvPr id="31" name="AutoShape 23"/>
               <p:cNvCxnSpPr>
                 <a:cxnSpLocks noChangeShapeType="1"/>
                 <a:stCxn id="15" idx="5"/>
@@ -18781,13 +18449,7 @@
           </p:cxnSp>
           <p:cxnSp>
             <p:nvCxnSpPr>
-              <p:cNvPr id="32" name="AutoShape 24">
-                <a:extLst>
-                  <a:ext uri="{FF2B5EF4-FFF2-40B4-BE49-F238E27FC236}">
-                    <a16:creationId xmlns:a16="http://schemas.microsoft.com/office/drawing/2014/main" id="{AC3EC4D7-BE9A-4E0D-85F7-55EECA2B3253}"/>
-                  </a:ext>
-                </a:extLst>
-              </p:cNvPr>
+              <p:cNvPr id="32" name="AutoShape 24"/>
               <p:cNvCxnSpPr>
                 <a:cxnSpLocks noChangeShapeType="1"/>
                 <a:stCxn id="16" idx="4"/>
@@ -18817,13 +18479,7 @@
           </p:cxnSp>
           <p:cxnSp>
             <p:nvCxnSpPr>
-              <p:cNvPr id="33" name="AutoShape 25">
-                <a:extLst>
-                  <a:ext uri="{FF2B5EF4-FFF2-40B4-BE49-F238E27FC236}">
-                    <a16:creationId xmlns:a16="http://schemas.microsoft.com/office/drawing/2014/main" id="{1755E5A6-1944-4476-A931-DA81299183F2}"/>
-                  </a:ext>
-                </a:extLst>
-              </p:cNvPr>
+              <p:cNvPr id="33" name="AutoShape 25"/>
               <p:cNvCxnSpPr>
                 <a:cxnSpLocks noChangeShapeType="1"/>
                 <a:stCxn id="17" idx="3"/>
@@ -18853,13 +18509,7 @@
           </p:cxnSp>
           <p:cxnSp>
             <p:nvCxnSpPr>
-              <p:cNvPr id="34" name="AutoShape 26">
-                <a:extLst>
-                  <a:ext uri="{FF2B5EF4-FFF2-40B4-BE49-F238E27FC236}">
-                    <a16:creationId xmlns:a16="http://schemas.microsoft.com/office/drawing/2014/main" id="{698B02A3-1F18-404D-BD0D-14E509E69305}"/>
-                  </a:ext>
-                </a:extLst>
-              </p:cNvPr>
+              <p:cNvPr id="34" name="AutoShape 26"/>
               <p:cNvCxnSpPr>
                 <a:cxnSpLocks noChangeShapeType="1"/>
                 <a:stCxn id="17" idx="4"/>
@@ -18889,13 +18539,7 @@
           </p:cxnSp>
           <p:cxnSp>
             <p:nvCxnSpPr>
-              <p:cNvPr id="35" name="AutoShape 27">
-                <a:extLst>
-                  <a:ext uri="{FF2B5EF4-FFF2-40B4-BE49-F238E27FC236}">
-                    <a16:creationId xmlns:a16="http://schemas.microsoft.com/office/drawing/2014/main" id="{3C6FFF8C-8AE9-49C3-BFC2-CB626B701510}"/>
-                  </a:ext>
-                </a:extLst>
-              </p:cNvPr>
+              <p:cNvPr id="35" name="AutoShape 27"/>
               <p:cNvCxnSpPr>
                 <a:cxnSpLocks noChangeShapeType="1"/>
                 <a:stCxn id="17" idx="5"/>
@@ -18925,13 +18569,7 @@
           </p:cxnSp>
           <p:cxnSp>
             <p:nvCxnSpPr>
-              <p:cNvPr id="36" name="AutoShape 28">
-                <a:extLst>
-                  <a:ext uri="{FF2B5EF4-FFF2-40B4-BE49-F238E27FC236}">
-                    <a16:creationId xmlns:a16="http://schemas.microsoft.com/office/drawing/2014/main" id="{7DA636FD-291B-4398-B015-71E1CFA76687}"/>
-                  </a:ext>
-                </a:extLst>
-              </p:cNvPr>
+              <p:cNvPr id="36" name="AutoShape 28"/>
               <p:cNvCxnSpPr>
                 <a:cxnSpLocks noChangeShapeType="1"/>
                 <a:stCxn id="18" idx="3"/>
@@ -18961,13 +18599,7 @@
           </p:cxnSp>
           <p:cxnSp>
             <p:nvCxnSpPr>
-              <p:cNvPr id="37" name="AutoShape 29">
-                <a:extLst>
-                  <a:ext uri="{FF2B5EF4-FFF2-40B4-BE49-F238E27FC236}">
-                    <a16:creationId xmlns:a16="http://schemas.microsoft.com/office/drawing/2014/main" id="{C99750AC-FC75-41C1-8CD8-4D1FCE21A614}"/>
-                  </a:ext>
-                </a:extLst>
-              </p:cNvPr>
+              <p:cNvPr id="37" name="AutoShape 29"/>
               <p:cNvCxnSpPr>
                 <a:cxnSpLocks noChangeShapeType="1"/>
                 <a:stCxn id="18" idx="5"/>
@@ -18997,13 +18629,7 @@
           </p:cxnSp>
           <p:cxnSp>
             <p:nvCxnSpPr>
-              <p:cNvPr id="38" name="AutoShape 30">
-                <a:extLst>
-                  <a:ext uri="{FF2B5EF4-FFF2-40B4-BE49-F238E27FC236}">
-                    <a16:creationId xmlns:a16="http://schemas.microsoft.com/office/drawing/2014/main" id="{2008A1E0-6919-4D74-A85A-BA989C23BF6E}"/>
-                  </a:ext>
-                </a:extLst>
-              </p:cNvPr>
+              <p:cNvPr id="38" name="AutoShape 30"/>
               <p:cNvCxnSpPr>
                 <a:cxnSpLocks noChangeShapeType="1"/>
                 <a:stCxn id="23" idx="4"/>
@@ -19034,13 +18660,7 @@
         </p:grpSp>
         <p:sp>
           <p:nvSpPr>
-            <p:cNvPr id="6" name="Line 31">
-              <a:extLst>
-                <a:ext uri="{FF2B5EF4-FFF2-40B4-BE49-F238E27FC236}">
-                  <a16:creationId xmlns:a16="http://schemas.microsoft.com/office/drawing/2014/main" id="{793423D6-0201-4854-ABC4-9AC34F9A6E74}"/>
-                </a:ext>
-              </a:extLst>
-            </p:cNvPr>
+            <p:cNvPr id="6" name="Line 31"/>
             <p:cNvSpPr>
               <a:spLocks noChangeShapeType="1"/>
             </p:cNvSpPr>
@@ -19081,13 +18701,7 @@
         </p:sp>
         <p:sp>
           <p:nvSpPr>
-            <p:cNvPr id="7" name="Text Box 32">
-              <a:extLst>
-                <a:ext uri="{FF2B5EF4-FFF2-40B4-BE49-F238E27FC236}">
-                  <a16:creationId xmlns:a16="http://schemas.microsoft.com/office/drawing/2014/main" id="{A52771C8-A4FB-4BE5-8398-8810FD946FD5}"/>
-                </a:ext>
-              </a:extLst>
-            </p:cNvPr>
+            <p:cNvPr id="7" name="Text Box 32"/>
             <p:cNvSpPr txBox="1">
               <a:spLocks noChangeArrowheads="1"/>
             </p:cNvSpPr>
@@ -19148,13 +18762,7 @@
         </p:sp>
         <p:sp>
           <p:nvSpPr>
-            <p:cNvPr id="8" name="Line 33">
-              <a:extLst>
-                <a:ext uri="{FF2B5EF4-FFF2-40B4-BE49-F238E27FC236}">
-                  <a16:creationId xmlns:a16="http://schemas.microsoft.com/office/drawing/2014/main" id="{CF4E0EFC-2164-4EAF-8ABD-56BDB7E76F6E}"/>
-                </a:ext>
-              </a:extLst>
-            </p:cNvPr>
+            <p:cNvPr id="8" name="Line 33"/>
             <p:cNvSpPr>
               <a:spLocks noChangeShapeType="1"/>
             </p:cNvSpPr>
@@ -19195,13 +18803,7 @@
         </p:sp>
         <p:sp>
           <p:nvSpPr>
-            <p:cNvPr id="9" name="Text Box 34">
-              <a:extLst>
-                <a:ext uri="{FF2B5EF4-FFF2-40B4-BE49-F238E27FC236}">
-                  <a16:creationId xmlns:a16="http://schemas.microsoft.com/office/drawing/2014/main" id="{7B8ECDE3-4997-40A3-89D0-CA41483D40F3}"/>
-                </a:ext>
-              </a:extLst>
-            </p:cNvPr>
+            <p:cNvPr id="9" name="Text Box 34"/>
             <p:cNvSpPr txBox="1">
               <a:spLocks noChangeArrowheads="1"/>
             </p:cNvSpPr>
@@ -19262,13 +18864,7 @@
         </p:sp>
         <p:sp>
           <p:nvSpPr>
-            <p:cNvPr id="10" name="Line 35">
-              <a:extLst>
-                <a:ext uri="{FF2B5EF4-FFF2-40B4-BE49-F238E27FC236}">
-                  <a16:creationId xmlns:a16="http://schemas.microsoft.com/office/drawing/2014/main" id="{B15C88E1-043E-4BD6-9F55-48E60DF37C2C}"/>
-                </a:ext>
-              </a:extLst>
-            </p:cNvPr>
+            <p:cNvPr id="10" name="Line 35"/>
             <p:cNvSpPr>
               <a:spLocks noChangeShapeType="1"/>
             </p:cNvSpPr>
@@ -19309,13 +18905,7 @@
         </p:sp>
         <p:sp>
           <p:nvSpPr>
-            <p:cNvPr id="11" name="Text Box 36">
-              <a:extLst>
-                <a:ext uri="{FF2B5EF4-FFF2-40B4-BE49-F238E27FC236}">
-                  <a16:creationId xmlns:a16="http://schemas.microsoft.com/office/drawing/2014/main" id="{90202F01-B175-4887-B058-A951804B1804}"/>
-                </a:ext>
-              </a:extLst>
-            </p:cNvPr>
+            <p:cNvPr id="11" name="Text Box 36"/>
             <p:cNvSpPr txBox="1">
               <a:spLocks noChangeArrowheads="1"/>
             </p:cNvSpPr>
@@ -19376,13 +18966,7 @@
         </p:sp>
         <p:sp>
           <p:nvSpPr>
-            <p:cNvPr id="12" name="Line 37">
-              <a:extLst>
-                <a:ext uri="{FF2B5EF4-FFF2-40B4-BE49-F238E27FC236}">
-                  <a16:creationId xmlns:a16="http://schemas.microsoft.com/office/drawing/2014/main" id="{8AB485BE-7BC9-4451-9337-EC1BA3CF2E39}"/>
-                </a:ext>
-              </a:extLst>
-            </p:cNvPr>
+            <p:cNvPr id="12" name="Line 37"/>
             <p:cNvSpPr>
               <a:spLocks noChangeShapeType="1"/>
             </p:cNvSpPr>
@@ -19423,13 +19007,7 @@
         </p:sp>
         <p:sp>
           <p:nvSpPr>
-            <p:cNvPr id="13" name="Text Box 38">
-              <a:extLst>
-                <a:ext uri="{FF2B5EF4-FFF2-40B4-BE49-F238E27FC236}">
-                  <a16:creationId xmlns:a16="http://schemas.microsoft.com/office/drawing/2014/main" id="{A4314A67-1979-45DC-B315-72ED21EF8ADB}"/>
-                </a:ext>
-              </a:extLst>
-            </p:cNvPr>
+            <p:cNvPr id="13" name="Text Box 38"/>
             <p:cNvSpPr txBox="1">
               <a:spLocks noChangeArrowheads="1"/>
             </p:cNvSpPr>
@@ -22281,13 +21859,7 @@
       </p:sp>
       <p:sp>
         <p:nvSpPr>
-          <p:cNvPr id="6" name="矩形 5">
-            <a:extLst>
-              <a:ext uri="{FF2B5EF4-FFF2-40B4-BE49-F238E27FC236}">
-                <a16:creationId xmlns:a16="http://schemas.microsoft.com/office/drawing/2014/main" id="{720D76AD-7F89-4BCB-A112-A47D79CBBAF6}"/>
-              </a:ext>
-            </a:extLst>
-          </p:cNvPr>
+          <p:cNvPr id="6" name="矩形 5"/>
           <p:cNvSpPr/>
           <p:nvPr/>
         </p:nvSpPr>
@@ -22336,13 +21908,7 @@
       </p:sp>
       <p:sp>
         <p:nvSpPr>
-          <p:cNvPr id="8" name="矩形 7">
-            <a:extLst>
-              <a:ext uri="{FF2B5EF4-FFF2-40B4-BE49-F238E27FC236}">
-                <a16:creationId xmlns:a16="http://schemas.microsoft.com/office/drawing/2014/main" id="{269AF05F-6313-41C6-92CA-DD8EA13E49C9}"/>
-              </a:ext>
-            </a:extLst>
-          </p:cNvPr>
+          <p:cNvPr id="8" name="矩形 7"/>
           <p:cNvSpPr/>
           <p:nvPr/>
         </p:nvSpPr>
@@ -22391,13 +21957,7 @@
       </p:sp>
       <p:sp>
         <p:nvSpPr>
-          <p:cNvPr id="9" name="矩形 8">
-            <a:extLst>
-              <a:ext uri="{FF2B5EF4-FFF2-40B4-BE49-F238E27FC236}">
-                <a16:creationId xmlns:a16="http://schemas.microsoft.com/office/drawing/2014/main" id="{D415355A-D7F8-4238-A67B-92A6FCC1EBCB}"/>
-              </a:ext>
-            </a:extLst>
-          </p:cNvPr>
+          <p:cNvPr id="9" name="矩形 8"/>
           <p:cNvSpPr/>
           <p:nvPr/>
         </p:nvSpPr>
@@ -22446,13 +22006,7 @@
       </p:sp>
       <p:sp>
         <p:nvSpPr>
-          <p:cNvPr id="12" name="矩形 11">
-            <a:extLst>
-              <a:ext uri="{FF2B5EF4-FFF2-40B4-BE49-F238E27FC236}">
-                <a16:creationId xmlns:a16="http://schemas.microsoft.com/office/drawing/2014/main" id="{B0773AB5-86D0-4703-BAF2-FF007B095440}"/>
-              </a:ext>
-            </a:extLst>
-          </p:cNvPr>
+          <p:cNvPr id="12" name="矩形 11"/>
           <p:cNvSpPr/>
           <p:nvPr/>
         </p:nvSpPr>
@@ -22501,13 +22055,7 @@
       </p:sp>
       <p:cxnSp>
         <p:nvCxnSpPr>
-          <p:cNvPr id="22" name="肘形连接符 21">
-            <a:extLst>
-              <a:ext uri="{FF2B5EF4-FFF2-40B4-BE49-F238E27FC236}">
-                <a16:creationId xmlns:a16="http://schemas.microsoft.com/office/drawing/2014/main" id="{C7E06AF3-9A5A-4551-8562-51B61A203FE5}"/>
-              </a:ext>
-            </a:extLst>
-          </p:cNvPr>
+          <p:cNvPr id="22" name="肘形连接符 21"/>
           <p:cNvCxnSpPr>
             <a:stCxn id="6" idx="2"/>
             <a:endCxn id="8" idx="0"/>
@@ -22545,13 +22093,7 @@
       </p:cxnSp>
       <p:cxnSp>
         <p:nvCxnSpPr>
-          <p:cNvPr id="26" name="肘形连接符 25">
-            <a:extLst>
-              <a:ext uri="{FF2B5EF4-FFF2-40B4-BE49-F238E27FC236}">
-                <a16:creationId xmlns:a16="http://schemas.microsoft.com/office/drawing/2014/main" id="{DB839431-4511-468A-8974-DA001769B18F}"/>
-              </a:ext>
-            </a:extLst>
-          </p:cNvPr>
+          <p:cNvPr id="26" name="肘形连接符 25"/>
           <p:cNvCxnSpPr>
             <a:stCxn id="6" idx="2"/>
             <a:endCxn id="12" idx="0"/>
@@ -22587,13 +22129,7 @@
       </p:cxnSp>
       <p:cxnSp>
         <p:nvCxnSpPr>
-          <p:cNvPr id="29" name="肘形连接符 28">
-            <a:extLst>
-              <a:ext uri="{FF2B5EF4-FFF2-40B4-BE49-F238E27FC236}">
-                <a16:creationId xmlns:a16="http://schemas.microsoft.com/office/drawing/2014/main" id="{31E79D84-8857-496C-A5B5-0EE81D3DE69E}"/>
-              </a:ext>
-            </a:extLst>
-          </p:cNvPr>
+          <p:cNvPr id="29" name="肘形连接符 28"/>
           <p:cNvCxnSpPr>
             <a:stCxn id="6" idx="2"/>
             <a:endCxn id="9" idx="0"/>
@@ -22629,13 +22165,7 @@
       </p:cxnSp>
       <p:sp>
         <p:nvSpPr>
-          <p:cNvPr id="31" name="矩形 30">
-            <a:extLst>
-              <a:ext uri="{FF2B5EF4-FFF2-40B4-BE49-F238E27FC236}">
-                <a16:creationId xmlns:a16="http://schemas.microsoft.com/office/drawing/2014/main" id="{34B788E9-857A-4672-BE39-BCA6462F1F31}"/>
-              </a:ext>
-            </a:extLst>
-          </p:cNvPr>
+          <p:cNvPr id="31" name="矩形 30"/>
           <p:cNvSpPr/>
           <p:nvPr/>
         </p:nvSpPr>
@@ -22684,13 +22214,7 @@
       </p:sp>
       <p:sp>
         <p:nvSpPr>
-          <p:cNvPr id="32" name="矩形 31">
-            <a:extLst>
-              <a:ext uri="{FF2B5EF4-FFF2-40B4-BE49-F238E27FC236}">
-                <a16:creationId xmlns:a16="http://schemas.microsoft.com/office/drawing/2014/main" id="{73692C49-67DB-495F-B5EE-CFA1349CABE2}"/>
-              </a:ext>
-            </a:extLst>
-          </p:cNvPr>
+          <p:cNvPr id="32" name="矩形 31"/>
           <p:cNvSpPr/>
           <p:nvPr/>
         </p:nvSpPr>
@@ -22739,13 +22263,7 @@
       </p:sp>
       <p:sp>
         <p:nvSpPr>
-          <p:cNvPr id="33" name="矩形 32">
-            <a:extLst>
-              <a:ext uri="{FF2B5EF4-FFF2-40B4-BE49-F238E27FC236}">
-                <a16:creationId xmlns:a16="http://schemas.microsoft.com/office/drawing/2014/main" id="{B5A87273-0738-4F68-BD3C-99AC49115C5C}"/>
-              </a:ext>
-            </a:extLst>
-          </p:cNvPr>
+          <p:cNvPr id="33" name="矩形 32"/>
           <p:cNvSpPr/>
           <p:nvPr/>
         </p:nvSpPr>
@@ -22794,13 +22312,7 @@
       </p:sp>
       <p:cxnSp>
         <p:nvCxnSpPr>
-          <p:cNvPr id="34" name="肘形连接符 33">
-            <a:extLst>
-              <a:ext uri="{FF2B5EF4-FFF2-40B4-BE49-F238E27FC236}">
-                <a16:creationId xmlns:a16="http://schemas.microsoft.com/office/drawing/2014/main" id="{40E7809F-DF00-44E0-B25E-B950F3598355}"/>
-              </a:ext>
-            </a:extLst>
-          </p:cNvPr>
+          <p:cNvPr id="34" name="肘形连接符 33"/>
           <p:cNvCxnSpPr>
             <a:endCxn id="31" idx="0"/>
           </p:cNvCxnSpPr>
@@ -22837,13 +22349,7 @@
       </p:cxnSp>
       <p:cxnSp>
         <p:nvCxnSpPr>
-          <p:cNvPr id="35" name="肘形连接符 34">
-            <a:extLst>
-              <a:ext uri="{FF2B5EF4-FFF2-40B4-BE49-F238E27FC236}">
-                <a16:creationId xmlns:a16="http://schemas.microsoft.com/office/drawing/2014/main" id="{CF1942D3-B28F-4EB5-97EE-142286E13C5B}"/>
-              </a:ext>
-            </a:extLst>
-          </p:cNvPr>
+          <p:cNvPr id="35" name="肘形连接符 34"/>
           <p:cNvCxnSpPr>
             <a:stCxn id="8" idx="2"/>
             <a:endCxn id="33" idx="0"/>
@@ -22879,13 +22385,7 @@
       </p:cxnSp>
       <p:cxnSp>
         <p:nvCxnSpPr>
-          <p:cNvPr id="36" name="肘形连接符 35">
-            <a:extLst>
-              <a:ext uri="{FF2B5EF4-FFF2-40B4-BE49-F238E27FC236}">
-                <a16:creationId xmlns:a16="http://schemas.microsoft.com/office/drawing/2014/main" id="{3A87C28D-4EEA-42F9-943F-A593139BE86F}"/>
-              </a:ext>
-            </a:extLst>
-          </p:cNvPr>
+          <p:cNvPr id="36" name="肘形连接符 35"/>
           <p:cNvCxnSpPr>
             <a:stCxn id="8" idx="2"/>
             <a:endCxn id="32" idx="0"/>
@@ -22921,13 +22421,7 @@
       </p:cxnSp>
       <p:sp>
         <p:nvSpPr>
-          <p:cNvPr id="37" name="矩形 36">
-            <a:extLst>
-              <a:ext uri="{FF2B5EF4-FFF2-40B4-BE49-F238E27FC236}">
-                <a16:creationId xmlns:a16="http://schemas.microsoft.com/office/drawing/2014/main" id="{CD449E7D-3431-4EE5-8B95-BE81E60C27BC}"/>
-              </a:ext>
-            </a:extLst>
-          </p:cNvPr>
+          <p:cNvPr id="37" name="矩形 36"/>
           <p:cNvSpPr/>
           <p:nvPr/>
         </p:nvSpPr>
@@ -22976,13 +22470,7 @@
       </p:sp>
       <p:sp>
         <p:nvSpPr>
-          <p:cNvPr id="38" name="矩形 37">
-            <a:extLst>
-              <a:ext uri="{FF2B5EF4-FFF2-40B4-BE49-F238E27FC236}">
-                <a16:creationId xmlns:a16="http://schemas.microsoft.com/office/drawing/2014/main" id="{70C72E56-FC11-40D5-B55F-BD3571D243C5}"/>
-              </a:ext>
-            </a:extLst>
-          </p:cNvPr>
+          <p:cNvPr id="38" name="矩形 37"/>
           <p:cNvSpPr/>
           <p:nvPr/>
         </p:nvSpPr>
@@ -23031,13 +22519,7 @@
       </p:sp>
       <p:sp>
         <p:nvSpPr>
-          <p:cNvPr id="39" name="矩形 38">
-            <a:extLst>
-              <a:ext uri="{FF2B5EF4-FFF2-40B4-BE49-F238E27FC236}">
-                <a16:creationId xmlns:a16="http://schemas.microsoft.com/office/drawing/2014/main" id="{51D5C545-CE1E-4CA4-8094-5EE507E1A2D1}"/>
-              </a:ext>
-            </a:extLst>
-          </p:cNvPr>
+          <p:cNvPr id="39" name="矩形 38"/>
           <p:cNvSpPr/>
           <p:nvPr/>
         </p:nvSpPr>
@@ -23086,13 +22568,7 @@
       </p:sp>
       <p:cxnSp>
         <p:nvCxnSpPr>
-          <p:cNvPr id="40" name="肘形连接符 39">
-            <a:extLst>
-              <a:ext uri="{FF2B5EF4-FFF2-40B4-BE49-F238E27FC236}">
-                <a16:creationId xmlns:a16="http://schemas.microsoft.com/office/drawing/2014/main" id="{4712BFCF-D685-4509-9FE4-67ADC316A519}"/>
-              </a:ext>
-            </a:extLst>
-          </p:cNvPr>
+          <p:cNvPr id="40" name="肘形连接符 39"/>
           <p:cNvCxnSpPr/>
           <p:nvPr/>
         </p:nvCxnSpPr>
@@ -23127,13 +22603,7 @@
       </p:cxnSp>
       <p:cxnSp>
         <p:nvCxnSpPr>
-          <p:cNvPr id="41" name="肘形连接符 40">
-            <a:extLst>
-              <a:ext uri="{FF2B5EF4-FFF2-40B4-BE49-F238E27FC236}">
-                <a16:creationId xmlns:a16="http://schemas.microsoft.com/office/drawing/2014/main" id="{8EB42C78-8FFD-45AA-B19B-880E8DB9B7D6}"/>
-              </a:ext>
-            </a:extLst>
-          </p:cNvPr>
+          <p:cNvPr id="41" name="肘形连接符 40"/>
           <p:cNvCxnSpPr/>
           <p:nvPr/>
         </p:nvCxnSpPr>
@@ -23166,13 +22636,7 @@
       </p:cxnSp>
       <p:cxnSp>
         <p:nvCxnSpPr>
-          <p:cNvPr id="42" name="肘形连接符 41">
-            <a:extLst>
-              <a:ext uri="{FF2B5EF4-FFF2-40B4-BE49-F238E27FC236}">
-                <a16:creationId xmlns:a16="http://schemas.microsoft.com/office/drawing/2014/main" id="{6CBBA2D8-52AD-4C6E-8EFF-EA79F8CDA9DA}"/>
-              </a:ext>
-            </a:extLst>
-          </p:cNvPr>
+          <p:cNvPr id="42" name="肘形连接符 41"/>
           <p:cNvCxnSpPr/>
           <p:nvPr/>
         </p:nvCxnSpPr>
@@ -25105,13 +24569,7 @@
       </p:sp>
       <p:sp>
         <p:nvSpPr>
-          <p:cNvPr id="24579" name="内容占位符 2">
-            <a:extLst>
-              <a:ext uri="{FF2B5EF4-FFF2-40B4-BE49-F238E27FC236}">
-                <a16:creationId xmlns:a16="http://schemas.microsoft.com/office/drawing/2014/main" id="{F4ACBF0B-90D0-436E-BC69-E0EC3C3CAD57}"/>
-              </a:ext>
-            </a:extLst>
-          </p:cNvPr>
+          <p:cNvPr id="24579" name="内容占位符 2"/>
           <p:cNvSpPr>
             <a:spLocks noGrp="1"/>
           </p:cNvSpPr>
@@ -25350,13 +24808,7 @@
       </p:pic>
       <p:sp>
         <p:nvSpPr>
-          <p:cNvPr id="112" name="矩形​​ 5">
-            <a:extLst>
-              <a:ext uri="{FF2B5EF4-FFF2-40B4-BE49-F238E27FC236}">
-                <a16:creationId xmlns:a16="http://schemas.microsoft.com/office/drawing/2014/main" id="{5838511D-7E47-4DB1-B588-26A9796CF488}"/>
-              </a:ext>
-            </a:extLst>
-          </p:cNvPr>
+          <p:cNvPr id="112" name="矩形​​ 5"/>
           <p:cNvSpPr/>
           <p:nvPr/>
         </p:nvSpPr>
@@ -25416,13 +24868,7 @@
       </p:sp>
       <p:sp>
         <p:nvSpPr>
-          <p:cNvPr id="113" name="流程图: 决策 112">
-            <a:extLst>
-              <a:ext uri="{FF2B5EF4-FFF2-40B4-BE49-F238E27FC236}">
-                <a16:creationId xmlns:a16="http://schemas.microsoft.com/office/drawing/2014/main" id="{4E69CBA6-926D-488C-A9A2-BEC2E1A5FBF3}"/>
-              </a:ext>
-            </a:extLst>
-          </p:cNvPr>
+          <p:cNvPr id="113" name="流程图: 决策 112"/>
           <p:cNvSpPr/>
           <p:nvPr/>
         </p:nvSpPr>
@@ -25477,13 +24923,7 @@
       </p:sp>
       <p:cxnSp>
         <p:nvCxnSpPr>
-          <p:cNvPr id="114" name="直接箭头​​连接符 9">
-            <a:extLst>
-              <a:ext uri="{FF2B5EF4-FFF2-40B4-BE49-F238E27FC236}">
-                <a16:creationId xmlns:a16="http://schemas.microsoft.com/office/drawing/2014/main" id="{F1C2BF6B-8E28-4A60-A1C2-97BE46929213}"/>
-              </a:ext>
-            </a:extLst>
-          </p:cNvPr>
+          <p:cNvPr id="114" name="直接箭头​​连接符 9"/>
           <p:cNvCxnSpPr>
             <a:endCxn id="113" idx="0"/>
           </p:cNvCxnSpPr>
@@ -25522,13 +24962,7 @@
       </p:cxnSp>
       <p:cxnSp>
         <p:nvCxnSpPr>
-          <p:cNvPr id="115" name="直接箭头​​连接符 10">
-            <a:extLst>
-              <a:ext uri="{FF2B5EF4-FFF2-40B4-BE49-F238E27FC236}">
-                <a16:creationId xmlns:a16="http://schemas.microsoft.com/office/drawing/2014/main" id="{AAA64ADE-C49B-4F98-AF24-85CD282BED0E}"/>
-              </a:ext>
-            </a:extLst>
-          </p:cNvPr>
+          <p:cNvPr id="115" name="直接箭头​​连接符 10"/>
           <p:cNvCxnSpPr>
             <a:endCxn id="112" idx="2"/>
           </p:cNvCxnSpPr>
@@ -25567,13 +25001,7 @@
       </p:cxnSp>
       <p:cxnSp>
         <p:nvCxnSpPr>
-          <p:cNvPr id="116" name="直接箭头​​连接符 17">
-            <a:extLst>
-              <a:ext uri="{FF2B5EF4-FFF2-40B4-BE49-F238E27FC236}">
-                <a16:creationId xmlns:a16="http://schemas.microsoft.com/office/drawing/2014/main" id="{4568CE9F-4F42-4AC4-B094-D95C90C25F8C}"/>
-              </a:ext>
-            </a:extLst>
-          </p:cNvPr>
+          <p:cNvPr id="116" name="直接箭头​​连接符 17"/>
           <p:cNvCxnSpPr/>
           <p:nvPr/>
         </p:nvCxnSpPr>
@@ -25626,13 +25054,7 @@
         </p:grpSpPr>
         <p:sp>
           <p:nvSpPr>
-            <p:cNvPr id="118" name="矩形​​ 7">
-              <a:extLst>
-                <a:ext uri="{FF2B5EF4-FFF2-40B4-BE49-F238E27FC236}">
-                  <a16:creationId xmlns:a16="http://schemas.microsoft.com/office/drawing/2014/main" id="{0913D239-C9B0-4CE3-93B1-74EF05DB807C}"/>
-                </a:ext>
-              </a:extLst>
-            </p:cNvPr>
+            <p:cNvPr id="118" name="矩形​​ 7"/>
             <p:cNvSpPr/>
             <p:nvPr/>
           </p:nvSpPr>
@@ -25681,13 +25103,7 @@
         </p:sp>
         <p:sp>
           <p:nvSpPr>
-            <p:cNvPr id="119" name="流程图: 联系 118">
-              <a:extLst>
-                <a:ext uri="{FF2B5EF4-FFF2-40B4-BE49-F238E27FC236}">
-                  <a16:creationId xmlns:a16="http://schemas.microsoft.com/office/drawing/2014/main" id="{39AFC428-C139-48CD-9FEB-737FB84BD4F8}"/>
-                </a:ext>
-              </a:extLst>
-            </p:cNvPr>
+            <p:cNvPr id="119" name="流程图: 联系 118"/>
             <p:cNvSpPr/>
             <p:nvPr/>
           </p:nvSpPr>
@@ -25737,13 +25153,7 @@
         </p:sp>
         <p:sp>
           <p:nvSpPr>
-            <p:cNvPr id="120" name="流程图: 联系 119">
-              <a:extLst>
-                <a:ext uri="{FF2B5EF4-FFF2-40B4-BE49-F238E27FC236}">
-                  <a16:creationId xmlns:a16="http://schemas.microsoft.com/office/drawing/2014/main" id="{487D4133-3B38-4CC1-B58F-F599FAB86D33}"/>
-                </a:ext>
-              </a:extLst>
-            </p:cNvPr>
+            <p:cNvPr id="120" name="流程图: 联系 119"/>
             <p:cNvSpPr/>
             <p:nvPr/>
           </p:nvSpPr>
@@ -25990,13 +25400,7 @@
       </p:sp>
       <p:cxnSp>
         <p:nvCxnSpPr>
-          <p:cNvPr id="122" name="直接箭头​​连接符 34">
-            <a:extLst>
-              <a:ext uri="{FF2B5EF4-FFF2-40B4-BE49-F238E27FC236}">
-                <a16:creationId xmlns:a16="http://schemas.microsoft.com/office/drawing/2014/main" id="{182B1309-6562-4EF2-A824-38EA8E74EE21}"/>
-              </a:ext>
-            </a:extLst>
-          </p:cNvPr>
+          <p:cNvPr id="122" name="直接箭头​​连接符 34"/>
           <p:cNvCxnSpPr/>
           <p:nvPr/>
         </p:nvCxnSpPr>
@@ -26229,13 +25633,7 @@
       </p:sp>
       <p:cxnSp>
         <p:nvCxnSpPr>
-          <p:cNvPr id="124" name="直接箭头​​连接符 33">
-            <a:extLst>
-              <a:ext uri="{FF2B5EF4-FFF2-40B4-BE49-F238E27FC236}">
-                <a16:creationId xmlns:a16="http://schemas.microsoft.com/office/drawing/2014/main" id="{227952FE-C64F-46B4-914F-300FEF195720}"/>
-              </a:ext>
-            </a:extLst>
-          </p:cNvPr>
+          <p:cNvPr id="124" name="直接箭头​​连接符 33"/>
           <p:cNvCxnSpPr/>
           <p:nvPr/>
         </p:nvCxnSpPr>
@@ -26272,13 +25670,7 @@
       </p:cxnSp>
       <p:cxnSp>
         <p:nvCxnSpPr>
-          <p:cNvPr id="125" name="直接箭头​​连接符 50">
-            <a:extLst>
-              <a:ext uri="{FF2B5EF4-FFF2-40B4-BE49-F238E27FC236}">
-                <a16:creationId xmlns:a16="http://schemas.microsoft.com/office/drawing/2014/main" id="{03A9C89B-A6C0-4EEC-9160-C4DBE62D3B55}"/>
-              </a:ext>
-            </a:extLst>
-          </p:cNvPr>
+          <p:cNvPr id="125" name="直接箭头​​连接符 50"/>
           <p:cNvCxnSpPr/>
           <p:nvPr/>
         </p:nvCxnSpPr>
@@ -27668,13 +27060,7 @@
       </p:sp>
       <p:sp>
         <p:nvSpPr>
-          <p:cNvPr id="28675" name="内容占位符 2">
-            <a:extLst>
-              <a:ext uri="{FF2B5EF4-FFF2-40B4-BE49-F238E27FC236}">
-                <a16:creationId xmlns:a16="http://schemas.microsoft.com/office/drawing/2014/main" id="{7C9812FB-394E-4A1E-9A9C-A7F3C77DD633}"/>
-              </a:ext>
-            </a:extLst>
-          </p:cNvPr>
+          <p:cNvPr id="28675" name="内容占位符 2"/>
           <p:cNvSpPr>
             <a:spLocks noGrp="1" noChangeArrowheads="1"/>
           </p:cNvSpPr>
@@ -27859,7 +27245,7 @@
       </p:sp>
       <p:pic>
         <p:nvPicPr>
-          <p:cNvPr id="29699" name="Picture 4"/>
+          <p:cNvPr id="29699" name="图片 1"/>
           <p:cNvPicPr>
             <a:picLocks noChangeAspect="1" noChangeArrowheads="1"/>
           </p:cNvPicPr>
@@ -27880,8 +27266,8 @@
         </p:blipFill>
         <p:spPr bwMode="auto">
           <a:xfrm>
-            <a:off x="2424113" y="982663"/>
-            <a:ext cx="7343775" cy="5875337"/>
+            <a:off x="3000375" y="1341438"/>
+            <a:ext cx="6392863" cy="5445125"/>
           </a:xfrm>
           <a:prstGeom prst="rect">
             <a:avLst/>
@@ -27890,33 +27276,23 @@
           <a:ln>
             <a:noFill/>
           </a:ln>
-          <a:effectLst/>
           <a:extLst>
             <a:ext uri="{909E8E84-426E-40DD-AFC4-6F175D3DCCD1}">
               <a14:hiddenFill xmlns:a14="http://schemas.microsoft.com/office/drawing/2010/main">
                 <a:solidFill>
-                  <a:schemeClr val="accent1"/>
+                  <a:srgbClr val="FFFFFF"/>
                 </a:solidFill>
               </a14:hiddenFill>
             </a:ext>
             <a:ext uri="{91240B29-F687-4F45-9708-019B960494DF}">
               <a14:hiddenLine xmlns:a14="http://schemas.microsoft.com/office/drawing/2010/main" w="9525">
                 <a:solidFill>
-                  <a:schemeClr val="tx1"/>
+                  <a:srgbClr val="000000"/>
                 </a:solidFill>
                 <a:miter lim="800000"/>
                 <a:headEnd/>
                 <a:tailEnd/>
               </a14:hiddenLine>
-            </a:ext>
-            <a:ext uri="{AF507438-7753-43E0-B8FC-AC1667EBCBE1}">
-              <a14:hiddenEffects xmlns:a14="http://schemas.microsoft.com/office/drawing/2010/main">
-                <a:effectLst>
-                  <a:outerShdw dist="35921" dir="2700000" algn="ctr" rotWithShape="0">
-                    <a:schemeClr val="bg2"/>
-                  </a:outerShdw>
-                </a:effectLst>
-              </a14:hiddenEffects>
             </a:ext>
           </a:extLst>
         </p:spPr>
@@ -28085,13 +27461,7 @@
       </p:sp>
       <p:sp>
         <p:nvSpPr>
-          <p:cNvPr id="31747" name="内容占位符 2">
-            <a:extLst>
-              <a:ext uri="{FF2B5EF4-FFF2-40B4-BE49-F238E27FC236}">
-                <a16:creationId xmlns:a16="http://schemas.microsoft.com/office/drawing/2014/main" id="{3E99D7B3-6A57-4122-AD96-3D7980A00C01}"/>
-              </a:ext>
-            </a:extLst>
-          </p:cNvPr>
+          <p:cNvPr id="31747" name="内容占位符 2"/>
           <p:cNvSpPr>
             <a:spLocks noGrp="1" noChangeArrowheads="1"/>
           </p:cNvSpPr>
@@ -28510,13 +27880,7 @@
         </p:grpSpPr>
         <p:sp>
           <p:nvSpPr>
-            <p:cNvPr id="30" name="椭圆 29">
-              <a:extLst>
-                <a:ext uri="{FF2B5EF4-FFF2-40B4-BE49-F238E27FC236}">
-                  <a16:creationId xmlns:a16="http://schemas.microsoft.com/office/drawing/2014/main" id="{F47B7A74-1E17-48DF-8D7D-F850908E9DE8}"/>
-                </a:ext>
-              </a:extLst>
-            </p:cNvPr>
+            <p:cNvPr id="30" name="椭圆 29"/>
             <p:cNvSpPr/>
             <p:nvPr/>
           </p:nvSpPr>
@@ -28564,13 +27928,7 @@
         </p:sp>
         <p:sp>
           <p:nvSpPr>
-            <p:cNvPr id="31" name="椭圆 30">
-              <a:extLst>
-                <a:ext uri="{FF2B5EF4-FFF2-40B4-BE49-F238E27FC236}">
-                  <a16:creationId xmlns:a16="http://schemas.microsoft.com/office/drawing/2014/main" id="{554905B4-1EF2-4786-AB68-E30C424875E4}"/>
-                </a:ext>
-              </a:extLst>
-            </p:cNvPr>
+            <p:cNvPr id="31" name="椭圆 30"/>
             <p:cNvSpPr/>
             <p:nvPr/>
           </p:nvSpPr>
@@ -28627,13 +27985,7 @@
         </p:sp>
         <p:sp>
           <p:nvSpPr>
-            <p:cNvPr id="32" name="椭圆 31">
-              <a:extLst>
-                <a:ext uri="{FF2B5EF4-FFF2-40B4-BE49-F238E27FC236}">
-                  <a16:creationId xmlns:a16="http://schemas.microsoft.com/office/drawing/2014/main" id="{A07D0A5E-439D-42C4-A8F4-58F98B55E5D2}"/>
-                </a:ext>
-              </a:extLst>
-            </p:cNvPr>
+            <p:cNvPr id="32" name="椭圆 31"/>
             <p:cNvSpPr/>
             <p:nvPr/>
           </p:nvSpPr>
@@ -28690,13 +28042,7 @@
         </p:sp>
         <p:sp>
           <p:nvSpPr>
-            <p:cNvPr id="33" name="椭圆 32">
-              <a:extLst>
-                <a:ext uri="{FF2B5EF4-FFF2-40B4-BE49-F238E27FC236}">
-                  <a16:creationId xmlns:a16="http://schemas.microsoft.com/office/drawing/2014/main" id="{861A3E04-CB5B-429D-A348-A93BAADF699C}"/>
-                </a:ext>
-              </a:extLst>
-            </p:cNvPr>
+            <p:cNvPr id="33" name="椭圆 32"/>
             <p:cNvSpPr/>
             <p:nvPr/>
           </p:nvSpPr>
@@ -28753,13 +28099,7 @@
         </p:sp>
         <p:sp>
           <p:nvSpPr>
-            <p:cNvPr id="34" name="椭圆 33">
-              <a:extLst>
-                <a:ext uri="{FF2B5EF4-FFF2-40B4-BE49-F238E27FC236}">
-                  <a16:creationId xmlns:a16="http://schemas.microsoft.com/office/drawing/2014/main" id="{8DD3EF24-1491-44D4-8315-ED3446C9583F}"/>
-                </a:ext>
-              </a:extLst>
-            </p:cNvPr>
+            <p:cNvPr id="34" name="椭圆 33"/>
             <p:cNvSpPr/>
             <p:nvPr/>
           </p:nvSpPr>
@@ -29474,7 +28814,7 @@
         </p:blipFill>
         <p:spPr bwMode="auto">
           <a:xfrm>
-            <a:off x="1524000" y="393700"/>
+            <a:off x="334963" y="304800"/>
             <a:ext cx="9144000" cy="6178550"/>
           </a:xfrm>
           <a:prstGeom prst="rect">
@@ -29562,35 +28902,87 @@
           </a:p>
         </p:txBody>
       </p:sp>
+      <p:sp>
+        <p:nvSpPr>
+          <p:cNvPr id="38915" name="内容占位符 2"/>
+          <p:cNvSpPr>
+            <a:spLocks noGrp="1" noChangeArrowheads="1"/>
+          </p:cNvSpPr>
+          <p:nvPr>
+            <p:ph idx="1"/>
+          </p:nvPr>
+        </p:nvSpPr>
+        <p:spPr/>
+        <p:txBody>
+          <a:bodyPr/>
+          <a:lstStyle/>
+          <a:p>
+            <a:endParaRPr lang="zh-CN" altLang="en-US" smtClean="0"/>
+          </a:p>
+        </p:txBody>
+      </p:sp>
       <p:pic>
         <p:nvPicPr>
-          <p:cNvPr id="2" name="图片 1"/>
+          <p:cNvPr id="38916" name="Picture 4"/>
           <p:cNvPicPr>
-            <a:picLocks noChangeAspect="1"/>
+            <a:picLocks noChangeAspect="1" noChangeArrowheads="1"/>
           </p:cNvPicPr>
           <p:nvPr/>
         </p:nvPicPr>
         <p:blipFill>
-          <a:blip r:embed="rId2"/>
+          <a:blip r:embed="rId2">
+            <a:extLst>
+              <a:ext uri="{28A0092B-C50C-407E-A947-70E740481C1C}">
+                <a14:useLocalDpi xmlns:a14="http://schemas.microsoft.com/office/drawing/2010/main" val="0"/>
+              </a:ext>
+            </a:extLst>
+          </a:blip>
+          <a:srcRect/>
           <a:stretch>
             <a:fillRect/>
           </a:stretch>
         </p:blipFill>
-        <p:spPr>
+        <p:spPr bwMode="auto">
           <a:xfrm>
-            <a:off x="1199456" y="1700808"/>
-            <a:ext cx="10293350" cy="4537075"/>
+            <a:off x="1524000" y="1052513"/>
+            <a:ext cx="9017000" cy="5446712"/>
           </a:xfrm>
           <a:prstGeom prst="rect">
             <a:avLst/>
           </a:prstGeom>
-          <a:effectLst>
-            <a:outerShdw blurRad="50800" dist="38100" dir="2700000" algn="tl" rotWithShape="0">
-              <a:prstClr val="black">
-                <a:alpha val="40000"/>
-              </a:prstClr>
-            </a:outerShdw>
-          </a:effectLst>
+          <a:noFill/>
+          <a:ln>
+            <a:noFill/>
+          </a:ln>
+          <a:effectLst/>
+          <a:extLst>
+            <a:ext uri="{909E8E84-426E-40DD-AFC4-6F175D3DCCD1}">
+              <a14:hiddenFill xmlns:a14="http://schemas.microsoft.com/office/drawing/2010/main">
+                <a:solidFill>
+                  <a:schemeClr val="accent1"/>
+                </a:solidFill>
+              </a14:hiddenFill>
+            </a:ext>
+            <a:ext uri="{91240B29-F687-4F45-9708-019B960494DF}">
+              <a14:hiddenLine xmlns:a14="http://schemas.microsoft.com/office/drawing/2010/main" w="9525">
+                <a:solidFill>
+                  <a:schemeClr val="tx1"/>
+                </a:solidFill>
+                <a:miter lim="800000"/>
+                <a:headEnd/>
+                <a:tailEnd/>
+              </a14:hiddenLine>
+            </a:ext>
+            <a:ext uri="{AF507438-7753-43E0-B8FC-AC1667EBCBE1}">
+              <a14:hiddenEffects xmlns:a14="http://schemas.microsoft.com/office/drawing/2010/main">
+                <a:effectLst>
+                  <a:outerShdw dist="35921" dir="2700000" algn="ctr" rotWithShape="0">
+                    <a:schemeClr val="bg2"/>
+                  </a:outerShdw>
+                </a:effectLst>
+              </a14:hiddenEffects>
+            </a:ext>
+          </a:extLst>
         </p:spPr>
       </p:pic>
     </p:spTree>
@@ -29650,31 +29042,395 @@
           </a:p>
         </p:txBody>
       </p:sp>
-      <p:pic>
-        <p:nvPicPr>
-          <p:cNvPr id="39939" name="Picture 4"/>
-          <p:cNvPicPr>
-            <a:picLocks noChangeAspect="1" noChangeArrowheads="1"/>
-          </p:cNvPicPr>
+      <p:sp>
+        <p:nvSpPr>
+          <p:cNvPr id="2" name="流程图: 接点 1"/>
+          <p:cNvSpPr/>
           <p:nvPr/>
-        </p:nvPicPr>
-        <p:blipFill>
-          <a:blip r:embed="rId2">
-            <a:extLst>
-              <a:ext uri="{28A0092B-C50C-407E-A947-70E740481C1C}">
-                <a14:useLocalDpi xmlns:a14="http://schemas.microsoft.com/office/drawing/2010/main" val="0"/>
-              </a:ext>
-            </a:extLst>
-          </a:blip>
-          <a:srcRect/>
-          <a:stretch>
-            <a:fillRect/>
-          </a:stretch>
-        </p:blipFill>
+        </p:nvSpPr>
+        <p:spPr>
+          <a:xfrm>
+            <a:off x="3221038" y="1536700"/>
+            <a:ext cx="4826000" cy="4824413"/>
+          </a:xfrm>
+          <a:prstGeom prst="flowChartConnector">
+            <a:avLst/>
+          </a:prstGeom>
+          <a:solidFill>
+            <a:schemeClr val="accent3">
+              <a:lumMod val="95000"/>
+            </a:schemeClr>
+          </a:solidFill>
+        </p:spPr>
+        <p:style>
+          <a:lnRef idx="2">
+            <a:schemeClr val="accent1">
+              <a:shade val="50000"/>
+            </a:schemeClr>
+          </a:lnRef>
+          <a:fillRef idx="1">
+            <a:schemeClr val="accent1"/>
+          </a:fillRef>
+          <a:effectRef idx="0">
+            <a:schemeClr val="accent1"/>
+          </a:effectRef>
+          <a:fontRef idx="minor">
+            <a:schemeClr val="lt1"/>
+          </a:fontRef>
+        </p:style>
+        <p:txBody>
+          <a:bodyPr anchor="ctr"/>
+          <a:lstStyle/>
+          <a:p>
+            <a:pPr algn="ctr">
+              <a:defRPr/>
+            </a:pPr>
+            <a:endParaRPr lang="zh-CN" altLang="en-US" sz="2000" b="1">
+              <a:latin typeface="微软雅黑" panose="020B0503020204020204" pitchFamily="34" charset="-122"/>
+              <a:ea typeface="微软雅黑" panose="020B0503020204020204" pitchFamily="34" charset="-122"/>
+            </a:endParaRPr>
+          </a:p>
+        </p:txBody>
+      </p:sp>
+      <p:sp>
+        <p:nvSpPr>
+          <p:cNvPr id="3" name="流程图: 接点 2"/>
+          <p:cNvSpPr/>
+          <p:nvPr/>
+        </p:nvSpPr>
+        <p:spPr>
+          <a:xfrm>
+            <a:off x="3648075" y="2276475"/>
+            <a:ext cx="4049713" cy="4084638"/>
+          </a:xfrm>
+          <a:prstGeom prst="flowChartConnector">
+            <a:avLst/>
+          </a:prstGeom>
+        </p:spPr>
+        <p:style>
+          <a:lnRef idx="2">
+            <a:schemeClr val="accent1">
+              <a:shade val="50000"/>
+            </a:schemeClr>
+          </a:lnRef>
+          <a:fillRef idx="1">
+            <a:schemeClr val="accent1"/>
+          </a:fillRef>
+          <a:effectRef idx="0">
+            <a:schemeClr val="accent1"/>
+          </a:effectRef>
+          <a:fontRef idx="minor">
+            <a:schemeClr val="lt1"/>
+          </a:fontRef>
+        </p:style>
+        <p:txBody>
+          <a:bodyPr anchor="ctr"/>
+          <a:lstStyle/>
+          <a:p>
+            <a:pPr algn="ctr">
+              <a:defRPr/>
+            </a:pPr>
+            <a:endParaRPr lang="zh-CN" altLang="en-US" sz="2000" b="1">
+              <a:latin typeface="微软雅黑" panose="020B0503020204020204" pitchFamily="34" charset="-122"/>
+              <a:ea typeface="微软雅黑" panose="020B0503020204020204" pitchFamily="34" charset="-122"/>
+            </a:endParaRPr>
+          </a:p>
+        </p:txBody>
+      </p:sp>
+      <p:sp>
+        <p:nvSpPr>
+          <p:cNvPr id="5" name="流程图: 接点 4"/>
+          <p:cNvSpPr/>
+          <p:nvPr/>
+        </p:nvSpPr>
+        <p:spPr>
+          <a:xfrm>
+            <a:off x="3935413" y="2924175"/>
+            <a:ext cx="3551237" cy="3436938"/>
+          </a:xfrm>
+          <a:prstGeom prst="flowChartConnector">
+            <a:avLst/>
+          </a:prstGeom>
+          <a:solidFill>
+            <a:schemeClr val="accent1">
+              <a:lumMod val="90000"/>
+            </a:schemeClr>
+          </a:solidFill>
+        </p:spPr>
+        <p:style>
+          <a:lnRef idx="2">
+            <a:schemeClr val="accent1">
+              <a:shade val="50000"/>
+            </a:schemeClr>
+          </a:lnRef>
+          <a:fillRef idx="1">
+            <a:schemeClr val="accent1"/>
+          </a:fillRef>
+          <a:effectRef idx="0">
+            <a:schemeClr val="accent1"/>
+          </a:effectRef>
+          <a:fontRef idx="minor">
+            <a:schemeClr val="lt1"/>
+          </a:fontRef>
+        </p:style>
+        <p:txBody>
+          <a:bodyPr anchor="ctr"/>
+          <a:lstStyle/>
+          <a:p>
+            <a:pPr algn="ctr">
+              <a:defRPr/>
+            </a:pPr>
+            <a:endParaRPr lang="zh-CN" altLang="en-US" sz="2000" b="1">
+              <a:latin typeface="微软雅黑" panose="020B0503020204020204" pitchFamily="34" charset="-122"/>
+              <a:ea typeface="微软雅黑" panose="020B0503020204020204" pitchFamily="34" charset="-122"/>
+            </a:endParaRPr>
+          </a:p>
+        </p:txBody>
+      </p:sp>
+      <p:sp>
+        <p:nvSpPr>
+          <p:cNvPr id="7" name="流程图: 接点 6"/>
+          <p:cNvSpPr/>
+          <p:nvPr/>
+        </p:nvSpPr>
+        <p:spPr>
+          <a:xfrm>
+            <a:off x="4148138" y="3492500"/>
+            <a:ext cx="3125787" cy="2868613"/>
+          </a:xfrm>
+          <a:prstGeom prst="flowChartConnector">
+            <a:avLst/>
+          </a:prstGeom>
+          <a:solidFill>
+            <a:schemeClr val="accent2">
+              <a:lumMod val="20000"/>
+              <a:lumOff val="80000"/>
+            </a:schemeClr>
+          </a:solidFill>
+        </p:spPr>
+        <p:style>
+          <a:lnRef idx="2">
+            <a:schemeClr val="accent1">
+              <a:shade val="50000"/>
+            </a:schemeClr>
+          </a:lnRef>
+          <a:fillRef idx="1">
+            <a:schemeClr val="accent1"/>
+          </a:fillRef>
+          <a:effectRef idx="0">
+            <a:schemeClr val="accent1"/>
+          </a:effectRef>
+          <a:fontRef idx="minor">
+            <a:schemeClr val="lt1"/>
+          </a:fontRef>
+        </p:style>
+        <p:txBody>
+          <a:bodyPr anchor="ctr"/>
+          <a:lstStyle/>
+          <a:p>
+            <a:pPr algn="ctr">
+              <a:defRPr/>
+            </a:pPr>
+            <a:endParaRPr lang="zh-CN" altLang="en-US" sz="2000" b="1">
+              <a:latin typeface="微软雅黑" panose="020B0503020204020204" pitchFamily="34" charset="-122"/>
+              <a:ea typeface="微软雅黑" panose="020B0503020204020204" pitchFamily="34" charset="-122"/>
+            </a:endParaRPr>
+          </a:p>
+        </p:txBody>
+      </p:sp>
+      <p:sp>
+        <p:nvSpPr>
+          <p:cNvPr id="9" name="流程图: 接点 8"/>
+          <p:cNvSpPr/>
+          <p:nvPr/>
+        </p:nvSpPr>
+        <p:spPr>
+          <a:xfrm>
+            <a:off x="4367213" y="3987800"/>
+            <a:ext cx="2665412" cy="2374900"/>
+          </a:xfrm>
+          <a:prstGeom prst="flowChartConnector">
+            <a:avLst/>
+          </a:prstGeom>
+          <a:solidFill>
+            <a:schemeClr val="accent2">
+              <a:lumMod val="40000"/>
+              <a:lumOff val="60000"/>
+            </a:schemeClr>
+          </a:solidFill>
+        </p:spPr>
+        <p:style>
+          <a:lnRef idx="2">
+            <a:schemeClr val="accent1">
+              <a:shade val="50000"/>
+            </a:schemeClr>
+          </a:lnRef>
+          <a:fillRef idx="1">
+            <a:schemeClr val="accent1"/>
+          </a:fillRef>
+          <a:effectRef idx="0">
+            <a:schemeClr val="accent1"/>
+          </a:effectRef>
+          <a:fontRef idx="minor">
+            <a:schemeClr val="lt1"/>
+          </a:fontRef>
+        </p:style>
+        <p:txBody>
+          <a:bodyPr anchor="ctr"/>
+          <a:lstStyle/>
+          <a:p>
+            <a:pPr algn="ctr">
+              <a:defRPr/>
+            </a:pPr>
+            <a:endParaRPr lang="zh-CN" altLang="en-US" sz="2000" b="1">
+              <a:latin typeface="微软雅黑" panose="020B0503020204020204" pitchFamily="34" charset="-122"/>
+              <a:ea typeface="微软雅黑" panose="020B0503020204020204" pitchFamily="34" charset="-122"/>
+            </a:endParaRPr>
+          </a:p>
+        </p:txBody>
+      </p:sp>
+      <p:sp>
+        <p:nvSpPr>
+          <p:cNvPr id="11" name="流程图: 接点 10"/>
+          <p:cNvSpPr/>
+          <p:nvPr/>
+        </p:nvSpPr>
+        <p:spPr>
+          <a:xfrm>
+            <a:off x="4727575" y="4498975"/>
+            <a:ext cx="2090738" cy="1863725"/>
+          </a:xfrm>
+          <a:prstGeom prst="flowChartConnector">
+            <a:avLst/>
+          </a:prstGeom>
+          <a:solidFill>
+            <a:schemeClr val="accent6">
+              <a:lumMod val="60000"/>
+              <a:lumOff val="40000"/>
+            </a:schemeClr>
+          </a:solidFill>
+        </p:spPr>
+        <p:style>
+          <a:lnRef idx="2">
+            <a:schemeClr val="accent1">
+              <a:shade val="50000"/>
+            </a:schemeClr>
+          </a:lnRef>
+          <a:fillRef idx="1">
+            <a:schemeClr val="accent1"/>
+          </a:fillRef>
+          <a:effectRef idx="0">
+            <a:schemeClr val="accent1"/>
+          </a:effectRef>
+          <a:fontRef idx="minor">
+            <a:schemeClr val="lt1"/>
+          </a:fontRef>
+        </p:style>
+        <p:txBody>
+          <a:bodyPr anchor="ctr"/>
+          <a:lstStyle/>
+          <a:p>
+            <a:pPr algn="ctr">
+              <a:defRPr/>
+            </a:pPr>
+            <a:endParaRPr lang="zh-CN" altLang="en-US" sz="2000" b="1" dirty="0">
+              <a:latin typeface="微软雅黑" panose="020B0503020204020204" pitchFamily="34" charset="-122"/>
+              <a:ea typeface="微软雅黑" panose="020B0503020204020204" pitchFamily="34" charset="-122"/>
+            </a:endParaRPr>
+          </a:p>
+        </p:txBody>
+      </p:sp>
+      <p:sp>
+        <p:nvSpPr>
+          <p:cNvPr id="13" name="流程图: 接点 12"/>
+          <p:cNvSpPr/>
+          <p:nvPr/>
+        </p:nvSpPr>
+        <p:spPr>
+          <a:xfrm>
+            <a:off x="5119688" y="5229225"/>
+            <a:ext cx="1271587" cy="1131888"/>
+          </a:xfrm>
+          <a:prstGeom prst="flowChartConnector">
+            <a:avLst/>
+          </a:prstGeom>
+        </p:spPr>
+        <p:style>
+          <a:lnRef idx="2">
+            <a:schemeClr val="accent2">
+              <a:shade val="50000"/>
+            </a:schemeClr>
+          </a:lnRef>
+          <a:fillRef idx="1">
+            <a:schemeClr val="accent2"/>
+          </a:fillRef>
+          <a:effectRef idx="0">
+            <a:schemeClr val="accent2"/>
+          </a:effectRef>
+          <a:fontRef idx="minor">
+            <a:schemeClr val="lt1"/>
+          </a:fontRef>
+        </p:style>
+        <p:txBody>
+          <a:bodyPr anchor="ctr"/>
+          <a:lstStyle/>
+          <a:p>
+            <a:pPr algn="ctr">
+              <a:defRPr/>
+            </a:pPr>
+            <a:r>
+              <a:rPr lang="zh-CN" altLang="en-US" sz="2000" b="1" dirty="0">
+                <a:solidFill>
+                  <a:schemeClr val="bg1">
+                    <a:lumMod val="95000"/>
+                  </a:schemeClr>
+                </a:solidFill>
+                <a:latin typeface="微软雅黑" panose="020B0503020204020204" pitchFamily="34" charset="-122"/>
+                <a:ea typeface="微软雅黑" panose="020B0503020204020204" pitchFamily="34" charset="-122"/>
+              </a:rPr>
+              <a:t>单元</a:t>
+            </a:r>
+            <a:endParaRPr lang="en-US" altLang="zh-CN" sz="2000" b="1" dirty="0">
+              <a:solidFill>
+                <a:schemeClr val="bg1">
+                  <a:lumMod val="95000"/>
+                </a:schemeClr>
+              </a:solidFill>
+              <a:latin typeface="微软雅黑" panose="020B0503020204020204" pitchFamily="34" charset="-122"/>
+              <a:ea typeface="微软雅黑" panose="020B0503020204020204" pitchFamily="34" charset="-122"/>
+            </a:endParaRPr>
+          </a:p>
+          <a:p>
+            <a:pPr algn="ctr">
+              <a:defRPr/>
+            </a:pPr>
+            <a:r>
+              <a:rPr lang="zh-CN" altLang="en-US" sz="2000" b="1" dirty="0">
+                <a:solidFill>
+                  <a:schemeClr val="bg1">
+                    <a:lumMod val="95000"/>
+                  </a:schemeClr>
+                </a:solidFill>
+                <a:latin typeface="微软雅黑" panose="020B0503020204020204" pitchFamily="34" charset="-122"/>
+                <a:ea typeface="微软雅黑" panose="020B0503020204020204" pitchFamily="34" charset="-122"/>
+              </a:rPr>
+              <a:t>测试</a:t>
+            </a:r>
+          </a:p>
+        </p:txBody>
+      </p:sp>
+      <p:sp>
+        <p:nvSpPr>
+          <p:cNvPr id="39946" name="文本框 14"/>
+          <p:cNvSpPr txBox="1">
+            <a:spLocks noChangeArrowheads="1"/>
+          </p:cNvSpPr>
+          <p:nvPr/>
+        </p:nvSpPr>
         <p:spPr bwMode="auto">
           <a:xfrm>
-            <a:off x="2640013" y="981075"/>
-            <a:ext cx="7045325" cy="5865813"/>
+            <a:off x="4970463" y="4838700"/>
+            <a:ext cx="1724025" cy="400050"/>
           </a:xfrm>
           <a:prstGeom prst="rect">
             <a:avLst/>
@@ -29683,37 +29439,961 @@
           <a:ln>
             <a:noFill/>
           </a:ln>
-          <a:effectLst/>
           <a:extLst>
             <a:ext uri="{909E8E84-426E-40DD-AFC4-6F175D3DCCD1}">
               <a14:hiddenFill xmlns:a14="http://schemas.microsoft.com/office/drawing/2010/main">
                 <a:solidFill>
-                  <a:schemeClr val="accent1"/>
+                  <a:srgbClr val="FFFFFF"/>
                 </a:solidFill>
               </a14:hiddenFill>
             </a:ext>
             <a:ext uri="{91240B29-F687-4F45-9708-019B960494DF}">
               <a14:hiddenLine xmlns:a14="http://schemas.microsoft.com/office/drawing/2010/main" w="9525">
                 <a:solidFill>
-                  <a:schemeClr val="tx1"/>
+                  <a:srgbClr val="000000"/>
                 </a:solidFill>
                 <a:miter lim="800000"/>
                 <a:headEnd/>
                 <a:tailEnd/>
               </a14:hiddenLine>
             </a:ext>
-            <a:ext uri="{AF507438-7753-43E0-B8FC-AC1667EBCBE1}">
-              <a14:hiddenEffects xmlns:a14="http://schemas.microsoft.com/office/drawing/2010/main">
-                <a:effectLst>
-                  <a:outerShdw dist="35921" dir="2700000" algn="ctr" rotWithShape="0">
-                    <a:schemeClr val="bg2"/>
-                  </a:outerShdw>
-                </a:effectLst>
-              </a14:hiddenEffects>
+          </a:extLst>
+        </p:spPr>
+        <p:txBody>
+          <a:bodyPr wrap="none">
+            <a:spAutoFit/>
+          </a:bodyPr>
+          <a:lstStyle>
+            <a:lvl1pPr>
+              <a:defRPr>
+                <a:solidFill>
+                  <a:schemeClr val="tx1"/>
+                </a:solidFill>
+                <a:latin typeface="Arial" panose="020B0604020202020204" pitchFamily="34" charset="0"/>
+                <a:ea typeface="宋体" panose="02010600030101010101" pitchFamily="2" charset="-122"/>
+              </a:defRPr>
+            </a:lvl1pPr>
+            <a:lvl2pPr marL="742950" indent="-285750">
+              <a:defRPr>
+                <a:solidFill>
+                  <a:schemeClr val="tx1"/>
+                </a:solidFill>
+                <a:latin typeface="Arial" panose="020B0604020202020204" pitchFamily="34" charset="0"/>
+                <a:ea typeface="宋体" panose="02010600030101010101" pitchFamily="2" charset="-122"/>
+              </a:defRPr>
+            </a:lvl2pPr>
+            <a:lvl3pPr marL="1143000" indent="-228600">
+              <a:defRPr>
+                <a:solidFill>
+                  <a:schemeClr val="tx1"/>
+                </a:solidFill>
+                <a:latin typeface="Arial" panose="020B0604020202020204" pitchFamily="34" charset="0"/>
+                <a:ea typeface="宋体" panose="02010600030101010101" pitchFamily="2" charset="-122"/>
+              </a:defRPr>
+            </a:lvl3pPr>
+            <a:lvl4pPr marL="1600200" indent="-228600">
+              <a:defRPr>
+                <a:solidFill>
+                  <a:schemeClr val="tx1"/>
+                </a:solidFill>
+                <a:latin typeface="Arial" panose="020B0604020202020204" pitchFamily="34" charset="0"/>
+                <a:ea typeface="宋体" panose="02010600030101010101" pitchFamily="2" charset="-122"/>
+              </a:defRPr>
+            </a:lvl4pPr>
+            <a:lvl5pPr marL="2057400" indent="-228600">
+              <a:defRPr>
+                <a:solidFill>
+                  <a:schemeClr val="tx1"/>
+                </a:solidFill>
+                <a:latin typeface="Arial" panose="020B0604020202020204" pitchFamily="34" charset="0"/>
+                <a:ea typeface="宋体" panose="02010600030101010101" pitchFamily="2" charset="-122"/>
+              </a:defRPr>
+            </a:lvl5pPr>
+            <a:lvl6pPr marL="2514600" indent="-228600" eaLnBrk="0" fontAlgn="base" hangingPunct="0">
+              <a:spcBef>
+                <a:spcPct val="0"/>
+              </a:spcBef>
+              <a:spcAft>
+                <a:spcPct val="0"/>
+              </a:spcAft>
+              <a:defRPr>
+                <a:solidFill>
+                  <a:schemeClr val="tx1"/>
+                </a:solidFill>
+                <a:latin typeface="Arial" panose="020B0604020202020204" pitchFamily="34" charset="0"/>
+                <a:ea typeface="宋体" panose="02010600030101010101" pitchFamily="2" charset="-122"/>
+              </a:defRPr>
+            </a:lvl6pPr>
+            <a:lvl7pPr marL="2971800" indent="-228600" eaLnBrk="0" fontAlgn="base" hangingPunct="0">
+              <a:spcBef>
+                <a:spcPct val="0"/>
+              </a:spcBef>
+              <a:spcAft>
+                <a:spcPct val="0"/>
+              </a:spcAft>
+              <a:defRPr>
+                <a:solidFill>
+                  <a:schemeClr val="tx1"/>
+                </a:solidFill>
+                <a:latin typeface="Arial" panose="020B0604020202020204" pitchFamily="34" charset="0"/>
+                <a:ea typeface="宋体" panose="02010600030101010101" pitchFamily="2" charset="-122"/>
+              </a:defRPr>
+            </a:lvl7pPr>
+            <a:lvl8pPr marL="3429000" indent="-228600" eaLnBrk="0" fontAlgn="base" hangingPunct="0">
+              <a:spcBef>
+                <a:spcPct val="0"/>
+              </a:spcBef>
+              <a:spcAft>
+                <a:spcPct val="0"/>
+              </a:spcAft>
+              <a:defRPr>
+                <a:solidFill>
+                  <a:schemeClr val="tx1"/>
+                </a:solidFill>
+                <a:latin typeface="Arial" panose="020B0604020202020204" pitchFamily="34" charset="0"/>
+                <a:ea typeface="宋体" panose="02010600030101010101" pitchFamily="2" charset="-122"/>
+              </a:defRPr>
+            </a:lvl8pPr>
+            <a:lvl9pPr marL="3886200" indent="-228600" eaLnBrk="0" fontAlgn="base" hangingPunct="0">
+              <a:spcBef>
+                <a:spcPct val="0"/>
+              </a:spcBef>
+              <a:spcAft>
+                <a:spcPct val="0"/>
+              </a:spcAft>
+              <a:defRPr>
+                <a:solidFill>
+                  <a:schemeClr val="tx1"/>
+                </a:solidFill>
+                <a:latin typeface="Arial" panose="020B0604020202020204" pitchFamily="34" charset="0"/>
+                <a:ea typeface="宋体" panose="02010600030101010101" pitchFamily="2" charset="-122"/>
+              </a:defRPr>
+            </a:lvl9pPr>
+          </a:lstStyle>
+          <a:p>
+            <a:r>
+              <a:rPr lang="zh-CN" altLang="en-US" sz="2000" b="1">
+                <a:solidFill>
+                  <a:schemeClr val="bg1"/>
+                </a:solidFill>
+                <a:latin typeface="微软雅黑" panose="020B0503020204020204" pitchFamily="34" charset="-122"/>
+                <a:ea typeface="微软雅黑" panose="020B0503020204020204" pitchFamily="34" charset="-122"/>
+              </a:rPr>
+              <a:t>白盒异常测试</a:t>
+            </a:r>
+          </a:p>
+        </p:txBody>
+      </p:sp>
+      <p:sp>
+        <p:nvSpPr>
+          <p:cNvPr id="39947" name="文本框 16"/>
+          <p:cNvSpPr txBox="1">
+            <a:spLocks noChangeArrowheads="1"/>
+          </p:cNvSpPr>
+          <p:nvPr/>
+        </p:nvSpPr>
+        <p:spPr bwMode="auto">
+          <a:xfrm>
+            <a:off x="5157788" y="3589338"/>
+            <a:ext cx="1209675" cy="400050"/>
+          </a:xfrm>
+          <a:prstGeom prst="rect">
+            <a:avLst/>
+          </a:prstGeom>
+          <a:noFill/>
+          <a:ln>
+            <a:noFill/>
+          </a:ln>
+          <a:extLst>
+            <a:ext uri="{909E8E84-426E-40DD-AFC4-6F175D3DCCD1}">
+              <a14:hiddenFill xmlns:a14="http://schemas.microsoft.com/office/drawing/2010/main">
+                <a:solidFill>
+                  <a:srgbClr val="FFFFFF"/>
+                </a:solidFill>
+              </a14:hiddenFill>
+            </a:ext>
+            <a:ext uri="{91240B29-F687-4F45-9708-019B960494DF}">
+              <a14:hiddenLine xmlns:a14="http://schemas.microsoft.com/office/drawing/2010/main" w="9525">
+                <a:solidFill>
+                  <a:srgbClr val="000000"/>
+                </a:solidFill>
+                <a:miter lim="800000"/>
+                <a:headEnd/>
+                <a:tailEnd/>
+              </a14:hiddenLine>
             </a:ext>
           </a:extLst>
         </p:spPr>
-      </p:pic>
+        <p:txBody>
+          <a:bodyPr wrap="none">
+            <a:spAutoFit/>
+          </a:bodyPr>
+          <a:lstStyle>
+            <a:lvl1pPr>
+              <a:defRPr>
+                <a:solidFill>
+                  <a:schemeClr val="tx1"/>
+                </a:solidFill>
+                <a:latin typeface="Arial" panose="020B0604020202020204" pitchFamily="34" charset="0"/>
+                <a:ea typeface="宋体" panose="02010600030101010101" pitchFamily="2" charset="-122"/>
+              </a:defRPr>
+            </a:lvl1pPr>
+            <a:lvl2pPr marL="742950" indent="-285750">
+              <a:defRPr>
+                <a:solidFill>
+                  <a:schemeClr val="tx1"/>
+                </a:solidFill>
+                <a:latin typeface="Arial" panose="020B0604020202020204" pitchFamily="34" charset="0"/>
+                <a:ea typeface="宋体" panose="02010600030101010101" pitchFamily="2" charset="-122"/>
+              </a:defRPr>
+            </a:lvl2pPr>
+            <a:lvl3pPr marL="1143000" indent="-228600">
+              <a:defRPr>
+                <a:solidFill>
+                  <a:schemeClr val="tx1"/>
+                </a:solidFill>
+                <a:latin typeface="Arial" panose="020B0604020202020204" pitchFamily="34" charset="0"/>
+                <a:ea typeface="宋体" panose="02010600030101010101" pitchFamily="2" charset="-122"/>
+              </a:defRPr>
+            </a:lvl3pPr>
+            <a:lvl4pPr marL="1600200" indent="-228600">
+              <a:defRPr>
+                <a:solidFill>
+                  <a:schemeClr val="tx1"/>
+                </a:solidFill>
+                <a:latin typeface="Arial" panose="020B0604020202020204" pitchFamily="34" charset="0"/>
+                <a:ea typeface="宋体" panose="02010600030101010101" pitchFamily="2" charset="-122"/>
+              </a:defRPr>
+            </a:lvl4pPr>
+            <a:lvl5pPr marL="2057400" indent="-228600">
+              <a:defRPr>
+                <a:solidFill>
+                  <a:schemeClr val="tx1"/>
+                </a:solidFill>
+                <a:latin typeface="Arial" panose="020B0604020202020204" pitchFamily="34" charset="0"/>
+                <a:ea typeface="宋体" panose="02010600030101010101" pitchFamily="2" charset="-122"/>
+              </a:defRPr>
+            </a:lvl5pPr>
+            <a:lvl6pPr marL="2514600" indent="-228600" eaLnBrk="0" fontAlgn="base" hangingPunct="0">
+              <a:spcBef>
+                <a:spcPct val="0"/>
+              </a:spcBef>
+              <a:spcAft>
+                <a:spcPct val="0"/>
+              </a:spcAft>
+              <a:defRPr>
+                <a:solidFill>
+                  <a:schemeClr val="tx1"/>
+                </a:solidFill>
+                <a:latin typeface="Arial" panose="020B0604020202020204" pitchFamily="34" charset="0"/>
+                <a:ea typeface="宋体" panose="02010600030101010101" pitchFamily="2" charset="-122"/>
+              </a:defRPr>
+            </a:lvl6pPr>
+            <a:lvl7pPr marL="2971800" indent="-228600" eaLnBrk="0" fontAlgn="base" hangingPunct="0">
+              <a:spcBef>
+                <a:spcPct val="0"/>
+              </a:spcBef>
+              <a:spcAft>
+                <a:spcPct val="0"/>
+              </a:spcAft>
+              <a:defRPr>
+                <a:solidFill>
+                  <a:schemeClr val="tx1"/>
+                </a:solidFill>
+                <a:latin typeface="Arial" panose="020B0604020202020204" pitchFamily="34" charset="0"/>
+                <a:ea typeface="宋体" panose="02010600030101010101" pitchFamily="2" charset="-122"/>
+              </a:defRPr>
+            </a:lvl7pPr>
+            <a:lvl8pPr marL="3429000" indent="-228600" eaLnBrk="0" fontAlgn="base" hangingPunct="0">
+              <a:spcBef>
+                <a:spcPct val="0"/>
+              </a:spcBef>
+              <a:spcAft>
+                <a:spcPct val="0"/>
+              </a:spcAft>
+              <a:defRPr>
+                <a:solidFill>
+                  <a:schemeClr val="tx1"/>
+                </a:solidFill>
+                <a:latin typeface="Arial" panose="020B0604020202020204" pitchFamily="34" charset="0"/>
+                <a:ea typeface="宋体" panose="02010600030101010101" pitchFamily="2" charset="-122"/>
+              </a:defRPr>
+            </a:lvl8pPr>
+            <a:lvl9pPr marL="3886200" indent="-228600" eaLnBrk="0" fontAlgn="base" hangingPunct="0">
+              <a:spcBef>
+                <a:spcPct val="0"/>
+              </a:spcBef>
+              <a:spcAft>
+                <a:spcPct val="0"/>
+              </a:spcAft>
+              <a:defRPr>
+                <a:solidFill>
+                  <a:schemeClr val="tx1"/>
+                </a:solidFill>
+                <a:latin typeface="Arial" panose="020B0604020202020204" pitchFamily="34" charset="0"/>
+                <a:ea typeface="宋体" panose="02010600030101010101" pitchFamily="2" charset="-122"/>
+              </a:defRPr>
+            </a:lvl9pPr>
+          </a:lstStyle>
+          <a:p>
+            <a:r>
+              <a:rPr lang="zh-CN" altLang="en-US" sz="2000" b="1">
+                <a:latin typeface="微软雅黑" panose="020B0503020204020204" pitchFamily="34" charset="-122"/>
+                <a:ea typeface="微软雅黑" panose="020B0503020204020204" pitchFamily="34" charset="-122"/>
+              </a:rPr>
+              <a:t>集成测试</a:t>
+            </a:r>
+          </a:p>
+        </p:txBody>
+      </p:sp>
+      <p:sp>
+        <p:nvSpPr>
+          <p:cNvPr id="39948" name="文本框 18"/>
+          <p:cNvSpPr txBox="1">
+            <a:spLocks noChangeArrowheads="1"/>
+          </p:cNvSpPr>
+          <p:nvPr/>
+        </p:nvSpPr>
+        <p:spPr bwMode="auto">
+          <a:xfrm>
+            <a:off x="5003800" y="3065463"/>
+            <a:ext cx="1466850" cy="400050"/>
+          </a:xfrm>
+          <a:prstGeom prst="rect">
+            <a:avLst/>
+          </a:prstGeom>
+          <a:noFill/>
+          <a:ln>
+            <a:noFill/>
+          </a:ln>
+          <a:extLst>
+            <a:ext uri="{909E8E84-426E-40DD-AFC4-6F175D3DCCD1}">
+              <a14:hiddenFill xmlns:a14="http://schemas.microsoft.com/office/drawing/2010/main">
+                <a:solidFill>
+                  <a:srgbClr val="FFFFFF"/>
+                </a:solidFill>
+              </a14:hiddenFill>
+            </a:ext>
+            <a:ext uri="{91240B29-F687-4F45-9708-019B960494DF}">
+              <a14:hiddenLine xmlns:a14="http://schemas.microsoft.com/office/drawing/2010/main" w="9525">
+                <a:solidFill>
+                  <a:srgbClr val="000000"/>
+                </a:solidFill>
+                <a:miter lim="800000"/>
+                <a:headEnd/>
+                <a:tailEnd/>
+              </a14:hiddenLine>
+            </a:ext>
+          </a:extLst>
+        </p:spPr>
+        <p:txBody>
+          <a:bodyPr wrap="none">
+            <a:spAutoFit/>
+          </a:bodyPr>
+          <a:lstStyle>
+            <a:lvl1pPr>
+              <a:defRPr>
+                <a:solidFill>
+                  <a:schemeClr val="tx1"/>
+                </a:solidFill>
+                <a:latin typeface="Arial" panose="020B0604020202020204" pitchFamily="34" charset="0"/>
+                <a:ea typeface="宋体" panose="02010600030101010101" pitchFamily="2" charset="-122"/>
+              </a:defRPr>
+            </a:lvl1pPr>
+            <a:lvl2pPr marL="742950" indent="-285750">
+              <a:defRPr>
+                <a:solidFill>
+                  <a:schemeClr val="tx1"/>
+                </a:solidFill>
+                <a:latin typeface="Arial" panose="020B0604020202020204" pitchFamily="34" charset="0"/>
+                <a:ea typeface="宋体" panose="02010600030101010101" pitchFamily="2" charset="-122"/>
+              </a:defRPr>
+            </a:lvl2pPr>
+            <a:lvl3pPr marL="1143000" indent="-228600">
+              <a:defRPr>
+                <a:solidFill>
+                  <a:schemeClr val="tx1"/>
+                </a:solidFill>
+                <a:latin typeface="Arial" panose="020B0604020202020204" pitchFamily="34" charset="0"/>
+                <a:ea typeface="宋体" panose="02010600030101010101" pitchFamily="2" charset="-122"/>
+              </a:defRPr>
+            </a:lvl3pPr>
+            <a:lvl4pPr marL="1600200" indent="-228600">
+              <a:defRPr>
+                <a:solidFill>
+                  <a:schemeClr val="tx1"/>
+                </a:solidFill>
+                <a:latin typeface="Arial" panose="020B0604020202020204" pitchFamily="34" charset="0"/>
+                <a:ea typeface="宋体" panose="02010600030101010101" pitchFamily="2" charset="-122"/>
+              </a:defRPr>
+            </a:lvl4pPr>
+            <a:lvl5pPr marL="2057400" indent="-228600">
+              <a:defRPr>
+                <a:solidFill>
+                  <a:schemeClr val="tx1"/>
+                </a:solidFill>
+                <a:latin typeface="Arial" panose="020B0604020202020204" pitchFamily="34" charset="0"/>
+                <a:ea typeface="宋体" panose="02010600030101010101" pitchFamily="2" charset="-122"/>
+              </a:defRPr>
+            </a:lvl5pPr>
+            <a:lvl6pPr marL="2514600" indent="-228600" eaLnBrk="0" fontAlgn="base" hangingPunct="0">
+              <a:spcBef>
+                <a:spcPct val="0"/>
+              </a:spcBef>
+              <a:spcAft>
+                <a:spcPct val="0"/>
+              </a:spcAft>
+              <a:defRPr>
+                <a:solidFill>
+                  <a:schemeClr val="tx1"/>
+                </a:solidFill>
+                <a:latin typeface="Arial" panose="020B0604020202020204" pitchFamily="34" charset="0"/>
+                <a:ea typeface="宋体" panose="02010600030101010101" pitchFamily="2" charset="-122"/>
+              </a:defRPr>
+            </a:lvl6pPr>
+            <a:lvl7pPr marL="2971800" indent="-228600" eaLnBrk="0" fontAlgn="base" hangingPunct="0">
+              <a:spcBef>
+                <a:spcPct val="0"/>
+              </a:spcBef>
+              <a:spcAft>
+                <a:spcPct val="0"/>
+              </a:spcAft>
+              <a:defRPr>
+                <a:solidFill>
+                  <a:schemeClr val="tx1"/>
+                </a:solidFill>
+                <a:latin typeface="Arial" panose="020B0604020202020204" pitchFamily="34" charset="0"/>
+                <a:ea typeface="宋体" panose="02010600030101010101" pitchFamily="2" charset="-122"/>
+              </a:defRPr>
+            </a:lvl7pPr>
+            <a:lvl8pPr marL="3429000" indent="-228600" eaLnBrk="0" fontAlgn="base" hangingPunct="0">
+              <a:spcBef>
+                <a:spcPct val="0"/>
+              </a:spcBef>
+              <a:spcAft>
+                <a:spcPct val="0"/>
+              </a:spcAft>
+              <a:defRPr>
+                <a:solidFill>
+                  <a:schemeClr val="tx1"/>
+                </a:solidFill>
+                <a:latin typeface="Arial" panose="020B0604020202020204" pitchFamily="34" charset="0"/>
+                <a:ea typeface="宋体" panose="02010600030101010101" pitchFamily="2" charset="-122"/>
+              </a:defRPr>
+            </a:lvl8pPr>
+            <a:lvl9pPr marL="3886200" indent="-228600" eaLnBrk="0" fontAlgn="base" hangingPunct="0">
+              <a:spcBef>
+                <a:spcPct val="0"/>
+              </a:spcBef>
+              <a:spcAft>
+                <a:spcPct val="0"/>
+              </a:spcAft>
+              <a:defRPr>
+                <a:solidFill>
+                  <a:schemeClr val="tx1"/>
+                </a:solidFill>
+                <a:latin typeface="Arial" panose="020B0604020202020204" pitchFamily="34" charset="0"/>
+                <a:ea typeface="宋体" panose="02010600030101010101" pitchFamily="2" charset="-122"/>
+              </a:defRPr>
+            </a:lvl9pPr>
+          </a:lstStyle>
+          <a:p>
+            <a:r>
+              <a:rPr lang="zh-CN" altLang="en-US" sz="2000" b="1">
+                <a:latin typeface="微软雅黑" panose="020B0503020204020204" pitchFamily="34" charset="-122"/>
+                <a:ea typeface="微软雅黑" panose="020B0503020204020204" pitchFamily="34" charset="-122"/>
+              </a:rPr>
+              <a:t>稳定性测试</a:t>
+            </a:r>
+          </a:p>
+        </p:txBody>
+      </p:sp>
+      <p:sp>
+        <p:nvSpPr>
+          <p:cNvPr id="39949" name="文本框 20"/>
+          <p:cNvSpPr txBox="1">
+            <a:spLocks noChangeArrowheads="1"/>
+          </p:cNvSpPr>
+          <p:nvPr/>
+        </p:nvSpPr>
+        <p:spPr bwMode="auto">
+          <a:xfrm>
+            <a:off x="5146675" y="4113213"/>
+            <a:ext cx="1209675" cy="400050"/>
+          </a:xfrm>
+          <a:prstGeom prst="rect">
+            <a:avLst/>
+          </a:prstGeom>
+          <a:noFill/>
+          <a:ln>
+            <a:noFill/>
+          </a:ln>
+          <a:extLst>
+            <a:ext uri="{909E8E84-426E-40DD-AFC4-6F175D3DCCD1}">
+              <a14:hiddenFill xmlns:a14="http://schemas.microsoft.com/office/drawing/2010/main">
+                <a:solidFill>
+                  <a:srgbClr val="FFFFFF"/>
+                </a:solidFill>
+              </a14:hiddenFill>
+            </a:ext>
+            <a:ext uri="{91240B29-F687-4F45-9708-019B960494DF}">
+              <a14:hiddenLine xmlns:a14="http://schemas.microsoft.com/office/drawing/2010/main" w="9525">
+                <a:solidFill>
+                  <a:srgbClr val="000000"/>
+                </a:solidFill>
+                <a:miter lim="800000"/>
+                <a:headEnd/>
+                <a:tailEnd/>
+              </a14:hiddenLine>
+            </a:ext>
+          </a:extLst>
+        </p:spPr>
+        <p:txBody>
+          <a:bodyPr wrap="none">
+            <a:spAutoFit/>
+          </a:bodyPr>
+          <a:lstStyle>
+            <a:lvl1pPr>
+              <a:defRPr>
+                <a:solidFill>
+                  <a:schemeClr val="tx1"/>
+                </a:solidFill>
+                <a:latin typeface="Arial" panose="020B0604020202020204" pitchFamily="34" charset="0"/>
+                <a:ea typeface="宋体" panose="02010600030101010101" pitchFamily="2" charset="-122"/>
+              </a:defRPr>
+            </a:lvl1pPr>
+            <a:lvl2pPr marL="742950" indent="-285750">
+              <a:defRPr>
+                <a:solidFill>
+                  <a:schemeClr val="tx1"/>
+                </a:solidFill>
+                <a:latin typeface="Arial" panose="020B0604020202020204" pitchFamily="34" charset="0"/>
+                <a:ea typeface="宋体" panose="02010600030101010101" pitchFamily="2" charset="-122"/>
+              </a:defRPr>
+            </a:lvl2pPr>
+            <a:lvl3pPr marL="1143000" indent="-228600">
+              <a:defRPr>
+                <a:solidFill>
+                  <a:schemeClr val="tx1"/>
+                </a:solidFill>
+                <a:latin typeface="Arial" panose="020B0604020202020204" pitchFamily="34" charset="0"/>
+                <a:ea typeface="宋体" panose="02010600030101010101" pitchFamily="2" charset="-122"/>
+              </a:defRPr>
+            </a:lvl3pPr>
+            <a:lvl4pPr marL="1600200" indent="-228600">
+              <a:defRPr>
+                <a:solidFill>
+                  <a:schemeClr val="tx1"/>
+                </a:solidFill>
+                <a:latin typeface="Arial" panose="020B0604020202020204" pitchFamily="34" charset="0"/>
+                <a:ea typeface="宋体" panose="02010600030101010101" pitchFamily="2" charset="-122"/>
+              </a:defRPr>
+            </a:lvl4pPr>
+            <a:lvl5pPr marL="2057400" indent="-228600">
+              <a:defRPr>
+                <a:solidFill>
+                  <a:schemeClr val="tx1"/>
+                </a:solidFill>
+                <a:latin typeface="Arial" panose="020B0604020202020204" pitchFamily="34" charset="0"/>
+                <a:ea typeface="宋体" panose="02010600030101010101" pitchFamily="2" charset="-122"/>
+              </a:defRPr>
+            </a:lvl5pPr>
+            <a:lvl6pPr marL="2514600" indent="-228600" eaLnBrk="0" fontAlgn="base" hangingPunct="0">
+              <a:spcBef>
+                <a:spcPct val="0"/>
+              </a:spcBef>
+              <a:spcAft>
+                <a:spcPct val="0"/>
+              </a:spcAft>
+              <a:defRPr>
+                <a:solidFill>
+                  <a:schemeClr val="tx1"/>
+                </a:solidFill>
+                <a:latin typeface="Arial" panose="020B0604020202020204" pitchFamily="34" charset="0"/>
+                <a:ea typeface="宋体" panose="02010600030101010101" pitchFamily="2" charset="-122"/>
+              </a:defRPr>
+            </a:lvl6pPr>
+            <a:lvl7pPr marL="2971800" indent="-228600" eaLnBrk="0" fontAlgn="base" hangingPunct="0">
+              <a:spcBef>
+                <a:spcPct val="0"/>
+              </a:spcBef>
+              <a:spcAft>
+                <a:spcPct val="0"/>
+              </a:spcAft>
+              <a:defRPr>
+                <a:solidFill>
+                  <a:schemeClr val="tx1"/>
+                </a:solidFill>
+                <a:latin typeface="Arial" panose="020B0604020202020204" pitchFamily="34" charset="0"/>
+                <a:ea typeface="宋体" panose="02010600030101010101" pitchFamily="2" charset="-122"/>
+              </a:defRPr>
+            </a:lvl7pPr>
+            <a:lvl8pPr marL="3429000" indent="-228600" eaLnBrk="0" fontAlgn="base" hangingPunct="0">
+              <a:spcBef>
+                <a:spcPct val="0"/>
+              </a:spcBef>
+              <a:spcAft>
+                <a:spcPct val="0"/>
+              </a:spcAft>
+              <a:defRPr>
+                <a:solidFill>
+                  <a:schemeClr val="tx1"/>
+                </a:solidFill>
+                <a:latin typeface="Arial" panose="020B0604020202020204" pitchFamily="34" charset="0"/>
+                <a:ea typeface="宋体" panose="02010600030101010101" pitchFamily="2" charset="-122"/>
+              </a:defRPr>
+            </a:lvl8pPr>
+            <a:lvl9pPr marL="3886200" indent="-228600" eaLnBrk="0" fontAlgn="base" hangingPunct="0">
+              <a:spcBef>
+                <a:spcPct val="0"/>
+              </a:spcBef>
+              <a:spcAft>
+                <a:spcPct val="0"/>
+              </a:spcAft>
+              <a:defRPr>
+                <a:solidFill>
+                  <a:schemeClr val="tx1"/>
+                </a:solidFill>
+                <a:latin typeface="Arial" panose="020B0604020202020204" pitchFamily="34" charset="0"/>
+                <a:ea typeface="宋体" panose="02010600030101010101" pitchFamily="2" charset="-122"/>
+              </a:defRPr>
+            </a:lvl9pPr>
+          </a:lstStyle>
+          <a:p>
+            <a:r>
+              <a:rPr lang="zh-CN" altLang="en-US" sz="2000" b="1">
+                <a:latin typeface="微软雅黑" panose="020B0503020204020204" pitchFamily="34" charset="-122"/>
+                <a:ea typeface="微软雅黑" panose="020B0503020204020204" pitchFamily="34" charset="-122"/>
+              </a:rPr>
+              <a:t>接口测试</a:t>
+            </a:r>
+          </a:p>
+        </p:txBody>
+      </p:sp>
+      <p:sp>
+        <p:nvSpPr>
+          <p:cNvPr id="39950" name="文本框 22"/>
+          <p:cNvSpPr txBox="1">
+            <a:spLocks noChangeArrowheads="1"/>
+          </p:cNvSpPr>
+          <p:nvPr/>
+        </p:nvSpPr>
+        <p:spPr bwMode="auto">
+          <a:xfrm>
+            <a:off x="5102225" y="2447925"/>
+            <a:ext cx="1209675" cy="400050"/>
+          </a:xfrm>
+          <a:prstGeom prst="rect">
+            <a:avLst/>
+          </a:prstGeom>
+          <a:noFill/>
+          <a:ln>
+            <a:noFill/>
+          </a:ln>
+          <a:extLst>
+            <a:ext uri="{909E8E84-426E-40DD-AFC4-6F175D3DCCD1}">
+              <a14:hiddenFill xmlns:a14="http://schemas.microsoft.com/office/drawing/2010/main">
+                <a:solidFill>
+                  <a:srgbClr val="FFFFFF"/>
+                </a:solidFill>
+              </a14:hiddenFill>
+            </a:ext>
+            <a:ext uri="{91240B29-F687-4F45-9708-019B960494DF}">
+              <a14:hiddenLine xmlns:a14="http://schemas.microsoft.com/office/drawing/2010/main" w="9525">
+                <a:solidFill>
+                  <a:srgbClr val="000000"/>
+                </a:solidFill>
+                <a:miter lim="800000"/>
+                <a:headEnd/>
+                <a:tailEnd/>
+              </a14:hiddenLine>
+            </a:ext>
+          </a:extLst>
+        </p:spPr>
+        <p:txBody>
+          <a:bodyPr wrap="none">
+            <a:spAutoFit/>
+          </a:bodyPr>
+          <a:lstStyle>
+            <a:lvl1pPr>
+              <a:defRPr>
+                <a:solidFill>
+                  <a:schemeClr val="tx1"/>
+                </a:solidFill>
+                <a:latin typeface="Arial" panose="020B0604020202020204" pitchFamily="34" charset="0"/>
+                <a:ea typeface="宋体" panose="02010600030101010101" pitchFamily="2" charset="-122"/>
+              </a:defRPr>
+            </a:lvl1pPr>
+            <a:lvl2pPr marL="742950" indent="-285750">
+              <a:defRPr>
+                <a:solidFill>
+                  <a:schemeClr val="tx1"/>
+                </a:solidFill>
+                <a:latin typeface="Arial" panose="020B0604020202020204" pitchFamily="34" charset="0"/>
+                <a:ea typeface="宋体" panose="02010600030101010101" pitchFamily="2" charset="-122"/>
+              </a:defRPr>
+            </a:lvl2pPr>
+            <a:lvl3pPr marL="1143000" indent="-228600">
+              <a:defRPr>
+                <a:solidFill>
+                  <a:schemeClr val="tx1"/>
+                </a:solidFill>
+                <a:latin typeface="Arial" panose="020B0604020202020204" pitchFamily="34" charset="0"/>
+                <a:ea typeface="宋体" panose="02010600030101010101" pitchFamily="2" charset="-122"/>
+              </a:defRPr>
+            </a:lvl3pPr>
+            <a:lvl4pPr marL="1600200" indent="-228600">
+              <a:defRPr>
+                <a:solidFill>
+                  <a:schemeClr val="tx1"/>
+                </a:solidFill>
+                <a:latin typeface="Arial" panose="020B0604020202020204" pitchFamily="34" charset="0"/>
+                <a:ea typeface="宋体" panose="02010600030101010101" pitchFamily="2" charset="-122"/>
+              </a:defRPr>
+            </a:lvl4pPr>
+            <a:lvl5pPr marL="2057400" indent="-228600">
+              <a:defRPr>
+                <a:solidFill>
+                  <a:schemeClr val="tx1"/>
+                </a:solidFill>
+                <a:latin typeface="Arial" panose="020B0604020202020204" pitchFamily="34" charset="0"/>
+                <a:ea typeface="宋体" panose="02010600030101010101" pitchFamily="2" charset="-122"/>
+              </a:defRPr>
+            </a:lvl5pPr>
+            <a:lvl6pPr marL="2514600" indent="-228600" eaLnBrk="0" fontAlgn="base" hangingPunct="0">
+              <a:spcBef>
+                <a:spcPct val="0"/>
+              </a:spcBef>
+              <a:spcAft>
+                <a:spcPct val="0"/>
+              </a:spcAft>
+              <a:defRPr>
+                <a:solidFill>
+                  <a:schemeClr val="tx1"/>
+                </a:solidFill>
+                <a:latin typeface="Arial" panose="020B0604020202020204" pitchFamily="34" charset="0"/>
+                <a:ea typeface="宋体" panose="02010600030101010101" pitchFamily="2" charset="-122"/>
+              </a:defRPr>
+            </a:lvl6pPr>
+            <a:lvl7pPr marL="2971800" indent="-228600" eaLnBrk="0" fontAlgn="base" hangingPunct="0">
+              <a:spcBef>
+                <a:spcPct val="0"/>
+              </a:spcBef>
+              <a:spcAft>
+                <a:spcPct val="0"/>
+              </a:spcAft>
+              <a:defRPr>
+                <a:solidFill>
+                  <a:schemeClr val="tx1"/>
+                </a:solidFill>
+                <a:latin typeface="Arial" panose="020B0604020202020204" pitchFamily="34" charset="0"/>
+                <a:ea typeface="宋体" panose="02010600030101010101" pitchFamily="2" charset="-122"/>
+              </a:defRPr>
+            </a:lvl7pPr>
+            <a:lvl8pPr marL="3429000" indent="-228600" eaLnBrk="0" fontAlgn="base" hangingPunct="0">
+              <a:spcBef>
+                <a:spcPct val="0"/>
+              </a:spcBef>
+              <a:spcAft>
+                <a:spcPct val="0"/>
+              </a:spcAft>
+              <a:defRPr>
+                <a:solidFill>
+                  <a:schemeClr val="tx1"/>
+                </a:solidFill>
+                <a:latin typeface="Arial" panose="020B0604020202020204" pitchFamily="34" charset="0"/>
+                <a:ea typeface="宋体" panose="02010600030101010101" pitchFamily="2" charset="-122"/>
+              </a:defRPr>
+            </a:lvl8pPr>
+            <a:lvl9pPr marL="3886200" indent="-228600" eaLnBrk="0" fontAlgn="base" hangingPunct="0">
+              <a:spcBef>
+                <a:spcPct val="0"/>
+              </a:spcBef>
+              <a:spcAft>
+                <a:spcPct val="0"/>
+              </a:spcAft>
+              <a:defRPr>
+                <a:solidFill>
+                  <a:schemeClr val="tx1"/>
+                </a:solidFill>
+                <a:latin typeface="Arial" panose="020B0604020202020204" pitchFamily="34" charset="0"/>
+                <a:ea typeface="宋体" panose="02010600030101010101" pitchFamily="2" charset="-122"/>
+              </a:defRPr>
+            </a:lvl9pPr>
+          </a:lstStyle>
+          <a:p>
+            <a:r>
+              <a:rPr lang="zh-CN" altLang="en-US" sz="2000" b="1">
+                <a:latin typeface="微软雅黑" panose="020B0503020204020204" pitchFamily="34" charset="-122"/>
+                <a:ea typeface="微软雅黑" panose="020B0503020204020204" pitchFamily="34" charset="-122"/>
+              </a:rPr>
+              <a:t>性能测试</a:t>
+            </a:r>
+          </a:p>
+        </p:txBody>
+      </p:sp>
+      <p:sp>
+        <p:nvSpPr>
+          <p:cNvPr id="39951" name="文本框 24"/>
+          <p:cNvSpPr txBox="1">
+            <a:spLocks noChangeArrowheads="1"/>
+          </p:cNvSpPr>
+          <p:nvPr/>
+        </p:nvSpPr>
+        <p:spPr bwMode="auto">
+          <a:xfrm>
+            <a:off x="5029200" y="1758950"/>
+            <a:ext cx="1211263" cy="400050"/>
+          </a:xfrm>
+          <a:prstGeom prst="rect">
+            <a:avLst/>
+          </a:prstGeom>
+          <a:noFill/>
+          <a:ln>
+            <a:noFill/>
+          </a:ln>
+          <a:extLst>
+            <a:ext uri="{909E8E84-426E-40DD-AFC4-6F175D3DCCD1}">
+              <a14:hiddenFill xmlns:a14="http://schemas.microsoft.com/office/drawing/2010/main">
+                <a:solidFill>
+                  <a:srgbClr val="FFFFFF"/>
+                </a:solidFill>
+              </a14:hiddenFill>
+            </a:ext>
+            <a:ext uri="{91240B29-F687-4F45-9708-019B960494DF}">
+              <a14:hiddenLine xmlns:a14="http://schemas.microsoft.com/office/drawing/2010/main" w="9525">
+                <a:solidFill>
+                  <a:srgbClr val="000000"/>
+                </a:solidFill>
+                <a:miter lim="800000"/>
+                <a:headEnd/>
+                <a:tailEnd/>
+              </a14:hiddenLine>
+            </a:ext>
+          </a:extLst>
+        </p:spPr>
+        <p:txBody>
+          <a:bodyPr wrap="none">
+            <a:spAutoFit/>
+          </a:bodyPr>
+          <a:lstStyle>
+            <a:lvl1pPr>
+              <a:defRPr>
+                <a:solidFill>
+                  <a:schemeClr val="tx1"/>
+                </a:solidFill>
+                <a:latin typeface="Arial" panose="020B0604020202020204" pitchFamily="34" charset="0"/>
+                <a:ea typeface="宋体" panose="02010600030101010101" pitchFamily="2" charset="-122"/>
+              </a:defRPr>
+            </a:lvl1pPr>
+            <a:lvl2pPr marL="742950" indent="-285750">
+              <a:defRPr>
+                <a:solidFill>
+                  <a:schemeClr val="tx1"/>
+                </a:solidFill>
+                <a:latin typeface="Arial" panose="020B0604020202020204" pitchFamily="34" charset="0"/>
+                <a:ea typeface="宋体" panose="02010600030101010101" pitchFamily="2" charset="-122"/>
+              </a:defRPr>
+            </a:lvl2pPr>
+            <a:lvl3pPr marL="1143000" indent="-228600">
+              <a:defRPr>
+                <a:solidFill>
+                  <a:schemeClr val="tx1"/>
+                </a:solidFill>
+                <a:latin typeface="Arial" panose="020B0604020202020204" pitchFamily="34" charset="0"/>
+                <a:ea typeface="宋体" panose="02010600030101010101" pitchFamily="2" charset="-122"/>
+              </a:defRPr>
+            </a:lvl3pPr>
+            <a:lvl4pPr marL="1600200" indent="-228600">
+              <a:defRPr>
+                <a:solidFill>
+                  <a:schemeClr val="tx1"/>
+                </a:solidFill>
+                <a:latin typeface="Arial" panose="020B0604020202020204" pitchFamily="34" charset="0"/>
+                <a:ea typeface="宋体" panose="02010600030101010101" pitchFamily="2" charset="-122"/>
+              </a:defRPr>
+            </a:lvl4pPr>
+            <a:lvl5pPr marL="2057400" indent="-228600">
+              <a:defRPr>
+                <a:solidFill>
+                  <a:schemeClr val="tx1"/>
+                </a:solidFill>
+                <a:latin typeface="Arial" panose="020B0604020202020204" pitchFamily="34" charset="0"/>
+                <a:ea typeface="宋体" panose="02010600030101010101" pitchFamily="2" charset="-122"/>
+              </a:defRPr>
+            </a:lvl5pPr>
+            <a:lvl6pPr marL="2514600" indent="-228600" eaLnBrk="0" fontAlgn="base" hangingPunct="0">
+              <a:spcBef>
+                <a:spcPct val="0"/>
+              </a:spcBef>
+              <a:spcAft>
+                <a:spcPct val="0"/>
+              </a:spcAft>
+              <a:defRPr>
+                <a:solidFill>
+                  <a:schemeClr val="tx1"/>
+                </a:solidFill>
+                <a:latin typeface="Arial" panose="020B0604020202020204" pitchFamily="34" charset="0"/>
+                <a:ea typeface="宋体" panose="02010600030101010101" pitchFamily="2" charset="-122"/>
+              </a:defRPr>
+            </a:lvl6pPr>
+            <a:lvl7pPr marL="2971800" indent="-228600" eaLnBrk="0" fontAlgn="base" hangingPunct="0">
+              <a:spcBef>
+                <a:spcPct val="0"/>
+              </a:spcBef>
+              <a:spcAft>
+                <a:spcPct val="0"/>
+              </a:spcAft>
+              <a:defRPr>
+                <a:solidFill>
+                  <a:schemeClr val="tx1"/>
+                </a:solidFill>
+                <a:latin typeface="Arial" panose="020B0604020202020204" pitchFamily="34" charset="0"/>
+                <a:ea typeface="宋体" panose="02010600030101010101" pitchFamily="2" charset="-122"/>
+              </a:defRPr>
+            </a:lvl7pPr>
+            <a:lvl8pPr marL="3429000" indent="-228600" eaLnBrk="0" fontAlgn="base" hangingPunct="0">
+              <a:spcBef>
+                <a:spcPct val="0"/>
+              </a:spcBef>
+              <a:spcAft>
+                <a:spcPct val="0"/>
+              </a:spcAft>
+              <a:defRPr>
+                <a:solidFill>
+                  <a:schemeClr val="tx1"/>
+                </a:solidFill>
+                <a:latin typeface="Arial" panose="020B0604020202020204" pitchFamily="34" charset="0"/>
+                <a:ea typeface="宋体" panose="02010600030101010101" pitchFamily="2" charset="-122"/>
+              </a:defRPr>
+            </a:lvl8pPr>
+            <a:lvl9pPr marL="3886200" indent="-228600" eaLnBrk="0" fontAlgn="base" hangingPunct="0">
+              <a:spcBef>
+                <a:spcPct val="0"/>
+              </a:spcBef>
+              <a:spcAft>
+                <a:spcPct val="0"/>
+              </a:spcAft>
+              <a:defRPr>
+                <a:solidFill>
+                  <a:schemeClr val="tx1"/>
+                </a:solidFill>
+                <a:latin typeface="Arial" panose="020B0604020202020204" pitchFamily="34" charset="0"/>
+                <a:ea typeface="宋体" panose="02010600030101010101" pitchFamily="2" charset="-122"/>
+              </a:defRPr>
+            </a:lvl9pPr>
+          </a:lstStyle>
+          <a:p>
+            <a:r>
+              <a:rPr lang="zh-CN" altLang="en-US" sz="2000" b="1">
+                <a:latin typeface="微软雅黑" panose="020B0503020204020204" pitchFamily="34" charset="-122"/>
+                <a:ea typeface="微软雅黑" panose="020B0503020204020204" pitchFamily="34" charset="-122"/>
+              </a:rPr>
+              <a:t>仿真测试</a:t>
+            </a:r>
+          </a:p>
+        </p:txBody>
+      </p:sp>
     </p:spTree>
   </p:cSld>
   <p:clrMapOvr>
@@ -30250,20 +30930,14 @@
           <a:p>
             <a:r>
               <a:rPr lang="zh-CN" altLang="en-US" smtClean="0"/>
-              <a:t>软件过程知多少</a:t>
+              <a:t>小结</a:t>
             </a:r>
           </a:p>
         </p:txBody>
       </p:sp>
       <p:sp>
         <p:nvSpPr>
-          <p:cNvPr id="43011" name="内容占位符 2">
-            <a:extLst>
-              <a:ext uri="{FF2B5EF4-FFF2-40B4-BE49-F238E27FC236}">
-                <a16:creationId xmlns:a16="http://schemas.microsoft.com/office/drawing/2014/main" id="{C07DB7D7-290C-4C31-A6F4-0F80F57C492D}"/>
-              </a:ext>
-            </a:extLst>
-          </p:cNvPr>
+          <p:cNvPr id="43011" name="内容占位符 2"/>
           <p:cNvSpPr>
             <a:spLocks noGrp="1" noChangeArrowheads="1"/>
           </p:cNvSpPr>
@@ -30946,13 +31620,7 @@
       </p:sp>
       <p:sp>
         <p:nvSpPr>
-          <p:cNvPr id="46083" name="内容占位符 2">
-            <a:extLst>
-              <a:ext uri="{FF2B5EF4-FFF2-40B4-BE49-F238E27FC236}">
-                <a16:creationId xmlns:a16="http://schemas.microsoft.com/office/drawing/2014/main" id="{5DF1B47C-8D28-410C-ACDA-4605F212A92F}"/>
-              </a:ext>
-            </a:extLst>
-          </p:cNvPr>
+          <p:cNvPr id="46083" name="内容占位符 2"/>
           <p:cNvSpPr>
             <a:spLocks noGrp="1"/>
           </p:cNvSpPr>
@@ -31845,13 +32513,7 @@
       </p:grpSpPr>
       <p:sp>
         <p:nvSpPr>
-          <p:cNvPr id="47106" name="标题 1">
-            <a:extLst>
-              <a:ext uri="{FF2B5EF4-FFF2-40B4-BE49-F238E27FC236}">
-                <a16:creationId xmlns:a16="http://schemas.microsoft.com/office/drawing/2014/main" id="{F82E649A-E0B5-48CB-8DEB-133901113DB2}"/>
-              </a:ext>
-            </a:extLst>
-          </p:cNvPr>
+          <p:cNvPr id="47106" name="标题 1"/>
           <p:cNvSpPr>
             <a:spLocks noGrp="1"/>
           </p:cNvSpPr>
@@ -31881,13 +32543,7 @@
       </p:sp>
       <p:sp>
         <p:nvSpPr>
-          <p:cNvPr id="47107" name="内容占位符 2">
-            <a:extLst>
-              <a:ext uri="{FF2B5EF4-FFF2-40B4-BE49-F238E27FC236}">
-                <a16:creationId xmlns:a16="http://schemas.microsoft.com/office/drawing/2014/main" id="{1D940AB4-5EB8-46F0-BA87-666CDAE3A1DA}"/>
-              </a:ext>
-            </a:extLst>
-          </p:cNvPr>
+          <p:cNvPr id="47107" name="内容占位符 2"/>
           <p:cNvSpPr>
             <a:spLocks noGrp="1"/>
           </p:cNvSpPr>
@@ -32041,7 +32697,7 @@
                 <a:latin typeface="Times New Roman" panose="02020603050405020304" pitchFamily="18" charset="0"/>
                 <a:cs typeface="Times New Roman" panose="02020603050405020304" pitchFamily="18" charset="0"/>
               </a:rPr>
-              <a:t>方法学，开覆盖了软件过程中所有关键的环节。</a:t>
+              <a:t>方法学，并覆盖了软件过程中所有关键的环节。</a:t>
             </a:r>
           </a:p>
         </p:txBody>
@@ -35365,8 +36021,8 @@
         </p:nvSpPr>
         <p:spPr bwMode="auto">
           <a:xfrm>
-            <a:off x="4475163" y="3538538"/>
-            <a:ext cx="3743325" cy="519112"/>
+            <a:off x="4459288" y="1916113"/>
+            <a:ext cx="3775075" cy="3778250"/>
           </a:xfrm>
           <a:prstGeom prst="ellipse">
             <a:avLst/>
@@ -35527,6 +36183,9 @@
           </a:lstStyle>
           <a:p>
             <a:pPr eaLnBrk="1" hangingPunct="1">
+              <a:lnSpc>
+                <a:spcPts val="12000"/>
+              </a:lnSpc>
               <a:spcBef>
                 <a:spcPct val="0"/>
               </a:spcBef>
@@ -36711,13 +37370,7 @@
       </p:sp>
       <p:sp>
         <p:nvSpPr>
-          <p:cNvPr id="25" name="Oval 104">
-            <a:extLst>
-              <a:ext uri="{FF2B5EF4-FFF2-40B4-BE49-F238E27FC236}">
-                <a16:creationId xmlns:a16="http://schemas.microsoft.com/office/drawing/2014/main" id="{2A516E93-0EA9-4695-8DDD-CFB4E802742D}"/>
-              </a:ext>
-            </a:extLst>
-          </p:cNvPr>
+          <p:cNvPr id="48" name="Oval 104"/>
           <p:cNvSpPr>
             <a:spLocks noChangeArrowheads="1"/>
           </p:cNvSpPr>
@@ -36771,13 +37424,7 @@
       </p:sp>
       <p:sp>
         <p:nvSpPr>
-          <p:cNvPr id="26" name="Oval 105">
-            <a:extLst>
-              <a:ext uri="{FF2B5EF4-FFF2-40B4-BE49-F238E27FC236}">
-                <a16:creationId xmlns:a16="http://schemas.microsoft.com/office/drawing/2014/main" id="{BB4A665F-DDA9-41DC-ACEB-E7B603AE79C4}"/>
-              </a:ext>
-            </a:extLst>
-          </p:cNvPr>
+          <p:cNvPr id="49" name="Oval 105"/>
           <p:cNvSpPr>
             <a:spLocks noChangeArrowheads="1"/>
           </p:cNvSpPr>
@@ -36831,13 +37478,7 @@
       </p:sp>
       <p:sp>
         <p:nvSpPr>
-          <p:cNvPr id="27" name="Oval 106">
-            <a:extLst>
-              <a:ext uri="{FF2B5EF4-FFF2-40B4-BE49-F238E27FC236}">
-                <a16:creationId xmlns:a16="http://schemas.microsoft.com/office/drawing/2014/main" id="{7A0E3FDF-2F0F-4773-9EDF-6D4EE46629A8}"/>
-              </a:ext>
-            </a:extLst>
-          </p:cNvPr>
+          <p:cNvPr id="50" name="Oval 106"/>
           <p:cNvSpPr>
             <a:spLocks noChangeArrowheads="1"/>
           </p:cNvSpPr>
@@ -36891,13 +37532,7 @@
       </p:sp>
       <p:sp>
         <p:nvSpPr>
-          <p:cNvPr id="28" name="Oval 107">
-            <a:extLst>
-              <a:ext uri="{FF2B5EF4-FFF2-40B4-BE49-F238E27FC236}">
-                <a16:creationId xmlns:a16="http://schemas.microsoft.com/office/drawing/2014/main" id="{FFFCF895-BAC3-4E63-BB03-E2FBC0F3F5D4}"/>
-              </a:ext>
-            </a:extLst>
-          </p:cNvPr>
+          <p:cNvPr id="51" name="Oval 107"/>
           <p:cNvSpPr>
             <a:spLocks noChangeArrowheads="1"/>
           </p:cNvSpPr>
@@ -36951,13 +37586,7 @@
       </p:sp>
       <p:sp>
         <p:nvSpPr>
-          <p:cNvPr id="29" name="Oval 108">
-            <a:extLst>
-              <a:ext uri="{FF2B5EF4-FFF2-40B4-BE49-F238E27FC236}">
-                <a16:creationId xmlns:a16="http://schemas.microsoft.com/office/drawing/2014/main" id="{6DF3C617-0179-4D01-822C-CE2C2E0BCF99}"/>
-              </a:ext>
-            </a:extLst>
-          </p:cNvPr>
+          <p:cNvPr id="52" name="Oval 108"/>
           <p:cNvSpPr>
             <a:spLocks noChangeArrowheads="1"/>
           </p:cNvSpPr>
@@ -37011,13 +37640,7 @@
       </p:sp>
       <p:sp>
         <p:nvSpPr>
-          <p:cNvPr id="30" name="Oval 109">
-            <a:extLst>
-              <a:ext uri="{FF2B5EF4-FFF2-40B4-BE49-F238E27FC236}">
-                <a16:creationId xmlns:a16="http://schemas.microsoft.com/office/drawing/2014/main" id="{C1433C16-D7AB-49E0-9514-DEECC760A90A}"/>
-              </a:ext>
-            </a:extLst>
-          </p:cNvPr>
+          <p:cNvPr id="53" name="Oval 109"/>
           <p:cNvSpPr>
             <a:spLocks noChangeArrowheads="1"/>
           </p:cNvSpPr>
@@ -37071,13 +37694,7 @@
       </p:sp>
       <p:sp>
         <p:nvSpPr>
-          <p:cNvPr id="31" name="Oval 110">
-            <a:extLst>
-              <a:ext uri="{FF2B5EF4-FFF2-40B4-BE49-F238E27FC236}">
-                <a16:creationId xmlns:a16="http://schemas.microsoft.com/office/drawing/2014/main" id="{F5A2B6F4-EF2E-4653-BA9F-224BB17C5473}"/>
-              </a:ext>
-            </a:extLst>
-          </p:cNvPr>
+          <p:cNvPr id="54" name="Oval 112"/>
           <p:cNvSpPr>
             <a:spLocks noChangeArrowheads="1"/>
           </p:cNvSpPr>
@@ -37085,138 +37702,8 @@
         </p:nvSpPr>
         <p:spPr bwMode="gray">
           <a:xfrm>
-            <a:off x="5514975" y="3540125"/>
-            <a:ext cx="260350" cy="519113"/>
-          </a:xfrm>
-          <a:prstGeom prst="ellipse">
-            <a:avLst/>
-          </a:prstGeom>
-          <a:gradFill rotWithShape="1">
-            <a:gsLst>
-              <a:gs pos="0">
-                <a:schemeClr val="folHlink">
-                  <a:gamma/>
-                  <a:tint val="0"/>
-                  <a:invGamma/>
-                </a:schemeClr>
-              </a:gs>
-              <a:gs pos="50000">
-                <a:schemeClr val="folHlink"/>
-              </a:gs>
-              <a:gs pos="100000">
-                <a:schemeClr val="folHlink">
-                  <a:gamma/>
-                  <a:tint val="0"/>
-                  <a:invGamma/>
-                </a:schemeClr>
-              </a:gs>
-            </a:gsLst>
-            <a:lin ang="2700000" scaled="1"/>
-          </a:gradFill>
-          <a:ln w="38100" algn="ctr">
-            <a:noFill/>
-            <a:round/>
-            <a:headEnd/>
-            <a:tailEnd/>
-          </a:ln>
-          <a:effectLst/>
-        </p:spPr>
-        <p:txBody>
-          <a:bodyPr wrap="none" anchor="ctr">
-            <a:spAutoFit/>
-          </a:bodyPr>
-          <a:lstStyle/>
-          <a:p>
-            <a:pPr eaLnBrk="1" hangingPunct="1">
-              <a:defRPr/>
-            </a:pPr>
-            <a:endParaRPr lang="zh-CN" altLang="en-US">
-              <a:latin typeface="Arial" charset="0"/>
-            </a:endParaRPr>
-          </a:p>
-        </p:txBody>
-      </p:sp>
-      <p:sp>
-        <p:nvSpPr>
-          <p:cNvPr id="32" name="Oval 111">
-            <a:extLst>
-              <a:ext uri="{FF2B5EF4-FFF2-40B4-BE49-F238E27FC236}">
-                <a16:creationId xmlns:a16="http://schemas.microsoft.com/office/drawing/2014/main" id="{5FC49240-8E23-4E31-A827-D185F5713338}"/>
-              </a:ext>
-            </a:extLst>
-          </p:cNvPr>
-          <p:cNvSpPr>
-            <a:spLocks noChangeArrowheads="1"/>
-          </p:cNvSpPr>
-          <p:nvPr/>
-        </p:nvSpPr>
-        <p:spPr bwMode="gray">
-          <a:xfrm>
-            <a:off x="5514975" y="3540125"/>
-            <a:ext cx="260350" cy="519113"/>
-          </a:xfrm>
-          <a:prstGeom prst="ellipse">
-            <a:avLst/>
-          </a:prstGeom>
-          <a:gradFill rotWithShape="1">
-            <a:gsLst>
-              <a:gs pos="0">
-                <a:schemeClr val="folHlink">
-                  <a:alpha val="32001"/>
-                </a:schemeClr>
-              </a:gs>
-              <a:gs pos="100000">
-                <a:schemeClr val="folHlink">
-                  <a:gamma/>
-                  <a:shade val="0"/>
-                  <a:invGamma/>
-                  <a:alpha val="89999"/>
-                </a:schemeClr>
-              </a:gs>
-            </a:gsLst>
-            <a:lin ang="2700000" scaled="1"/>
-          </a:gradFill>
-          <a:ln w="38100" algn="ctr">
-            <a:noFill/>
-            <a:round/>
-            <a:headEnd/>
-            <a:tailEnd/>
-          </a:ln>
-          <a:effectLst/>
-        </p:spPr>
-        <p:txBody>
-          <a:bodyPr wrap="none" anchor="ctr">
-            <a:spAutoFit/>
-          </a:bodyPr>
-          <a:lstStyle/>
-          <a:p>
-            <a:pPr eaLnBrk="1" hangingPunct="1">
-              <a:defRPr/>
-            </a:pPr>
-            <a:endParaRPr lang="zh-CN" altLang="en-US">
-              <a:latin typeface="Arial" charset="0"/>
-            </a:endParaRPr>
-          </a:p>
-        </p:txBody>
-      </p:sp>
-      <p:sp>
-        <p:nvSpPr>
-          <p:cNvPr id="33" name="Oval 112">
-            <a:extLst>
-              <a:ext uri="{FF2B5EF4-FFF2-40B4-BE49-F238E27FC236}">
-                <a16:creationId xmlns:a16="http://schemas.microsoft.com/office/drawing/2014/main" id="{10B2EE3D-AAEB-41EF-8E06-260BAE59FC1D}"/>
-              </a:ext>
-            </a:extLst>
-          </p:cNvPr>
-          <p:cNvSpPr>
-            <a:spLocks noChangeArrowheads="1"/>
-          </p:cNvSpPr>
-          <p:nvPr/>
-        </p:nvSpPr>
-        <p:spPr bwMode="gray">
-          <a:xfrm>
-            <a:off x="5626100" y="3538538"/>
-            <a:ext cx="1481138" cy="520700"/>
+            <a:off x="5694363" y="3149600"/>
+            <a:ext cx="1352550" cy="1358900"/>
           </a:xfrm>
           <a:prstGeom prst="ellipse">
             <a:avLst/>
@@ -37268,13 +37755,7 @@
       </p:sp>
       <p:sp>
         <p:nvSpPr>
-          <p:cNvPr id="34" name="Oval 113">
-            <a:extLst>
-              <a:ext uri="{FF2B5EF4-FFF2-40B4-BE49-F238E27FC236}">
-                <a16:creationId xmlns:a16="http://schemas.microsoft.com/office/drawing/2014/main" id="{858A5089-19D9-4111-80C2-23A5886E404F}"/>
-              </a:ext>
-            </a:extLst>
-          </p:cNvPr>
+          <p:cNvPr id="55" name="Oval 113"/>
           <p:cNvSpPr>
             <a:spLocks noChangeArrowheads="1"/>
           </p:cNvSpPr>
@@ -37282,8 +37763,8 @@
         </p:nvSpPr>
         <p:spPr bwMode="gray">
           <a:xfrm>
-            <a:off x="5627688" y="3541713"/>
-            <a:ext cx="1481137" cy="520700"/>
+            <a:off x="5640388" y="3081338"/>
+            <a:ext cx="1466850" cy="1439862"/>
           </a:xfrm>
           <a:prstGeom prst="ellipse">
             <a:avLst/>
@@ -37320,6 +37801,9 @@
           <a:lstStyle/>
           <a:p>
             <a:pPr eaLnBrk="1" hangingPunct="1">
+              <a:lnSpc>
+                <a:spcPts val="12000"/>
+              </a:lnSpc>
               <a:defRPr/>
             </a:pPr>
             <a:endParaRPr lang="zh-CN" altLang="en-US">
@@ -37330,7 +37814,7 @@
       </p:sp>
       <p:sp>
         <p:nvSpPr>
-          <p:cNvPr id="12314" name="Oval 114"/>
+          <p:cNvPr id="12312" name="Oval 114"/>
           <p:cNvSpPr>
             <a:spLocks noChangeArrowheads="1"/>
           </p:cNvSpPr>
@@ -37514,7 +37998,7 @@
       </p:sp>
       <p:grpSp>
         <p:nvGrpSpPr>
-          <p:cNvPr id="12315" name="Group 115"/>
+          <p:cNvPr id="12313" name="Group 115"/>
           <p:cNvGrpSpPr>
             <a:grpSpLocks/>
           </p:cNvGrpSpPr>
@@ -37530,7 +38014,7 @@
         </p:grpSpPr>
         <p:sp>
           <p:nvSpPr>
-            <p:cNvPr id="12317" name="Oval 116"/>
+            <p:cNvPr id="12315" name="Oval 116"/>
             <p:cNvSpPr>
               <a:spLocks noChangeArrowheads="1"/>
             </p:cNvSpPr>
@@ -37720,7 +38204,7 @@
         </p:sp>
         <p:sp>
           <p:nvSpPr>
-            <p:cNvPr id="12318" name="Oval 117"/>
+            <p:cNvPr id="12316" name="Oval 117"/>
             <p:cNvSpPr>
               <a:spLocks noChangeArrowheads="1"/>
             </p:cNvSpPr>
@@ -37912,7 +38396,7 @@
         </p:sp>
         <p:sp>
           <p:nvSpPr>
-            <p:cNvPr id="12319" name="Oval 118"/>
+            <p:cNvPr id="12317" name="Oval 118"/>
             <p:cNvSpPr>
               <a:spLocks noChangeArrowheads="1"/>
             </p:cNvSpPr>
@@ -38104,7 +38588,7 @@
         </p:sp>
         <p:sp>
           <p:nvSpPr>
-            <p:cNvPr id="12320" name="Oval 119"/>
+            <p:cNvPr id="12318" name="Oval 119"/>
             <p:cNvSpPr>
               <a:spLocks noChangeArrowheads="1"/>
             </p:cNvSpPr>
@@ -38297,7 +38781,7 @@
       </p:grpSp>
       <p:sp>
         <p:nvSpPr>
-          <p:cNvPr id="12316" name="Text Box 120"/>
+          <p:cNvPr id="62" name="Text Box 120"/>
           <p:cNvSpPr txBox="1">
             <a:spLocks noChangeArrowheads="1"/>
           </p:cNvSpPr>
@@ -38315,25 +38799,6 @@
           <a:ln>
             <a:noFill/>
           </a:ln>
-          <a:extLst>
-            <a:ext uri="{909E8E84-426E-40DD-AFC4-6F175D3DCCD1}">
-              <a14:hiddenFill xmlns:a14="http://schemas.microsoft.com/office/drawing/2010/main">
-                <a:solidFill>
-                  <a:srgbClr val="FFFFFF"/>
-                </a:solidFill>
-              </a14:hiddenFill>
-            </a:ext>
-            <a:ext uri="{91240B29-F687-4F45-9708-019B960494DF}">
-              <a14:hiddenLine xmlns:a14="http://schemas.microsoft.com/office/drawing/2010/main" w="9525" algn="ctr">
-                <a:solidFill>
-                  <a:srgbClr val="000000"/>
-                </a:solidFill>
-                <a:miter lim="800000"/>
-                <a:headEnd/>
-                <a:tailEnd/>
-              </a14:hiddenLine>
-            </a:ext>
-          </a:extLst>
         </p:spPr>
         <p:txBody>
           <a:bodyPr wrap="none">
@@ -38477,20 +38942,35 @@
               </a:spcBef>
               <a:buFontTx/>
               <a:buNone/>
+              <a:defRPr/>
             </a:pPr>
             <a:r>
-              <a:rPr lang="zh-CN" altLang="en-US">
+              <a:rPr lang="zh-CN" altLang="en-US" b="1" dirty="0">
                 <a:solidFill>
                   <a:srgbClr val="000000"/>
                 </a:solidFill>
+                <a:effectLst>
+                  <a:outerShdw blurRad="38100" dist="38100" dir="2700000" algn="tl">
+                    <a:srgbClr val="000000">
+                      <a:alpha val="43137"/>
+                    </a:srgbClr>
+                  </a:outerShdw>
+                </a:effectLst>
                 <a:ea typeface="宋体" panose="02010600030101010101" pitchFamily="2" charset="-122"/>
               </a:rPr>
               <a:t>数据结构</a:t>
             </a:r>
-            <a:endParaRPr lang="en-US" altLang="zh-CN">
+            <a:endParaRPr lang="en-US" altLang="zh-CN" b="1" dirty="0">
               <a:solidFill>
                 <a:srgbClr val="000000"/>
               </a:solidFill>
+              <a:effectLst>
+                <a:outerShdw blurRad="38100" dist="38100" dir="2700000" algn="tl">
+                  <a:srgbClr val="000000">
+                    <a:alpha val="43137"/>
+                  </a:srgbClr>
+                </a:outerShdw>
+              </a:effectLst>
               <a:ea typeface="宋体" panose="02010600030101010101" pitchFamily="2" charset="-122"/>
             </a:endParaRPr>
           </a:p>

</xml_diff>